<commit_message>
Remove step options no_input, starting, and terminal
</commit_message>
<xml_diff>
--- a/doc/charts.pptx
+++ b/doc/charts.pptx
@@ -6,6 +6,7 @@
   </p:sldMasterIdLst>
   <p:sldIdLst>
     <p:sldId id="256" r:id="rId2"/>
+    <p:sldId id="257" r:id="rId3"/>
   </p:sldIdLst>
   <p:sldSz cx="9144000" cy="6858000" type="screen4x3"/>
   <p:notesSz cx="6858000" cy="9144000"/>
@@ -288,7 +289,7 @@
           <a:p>
             <a:fld id="{E5BFB0E3-31D7-3147-A5E0-5689882FCFEF}" type="datetimeFigureOut">
               <a:rPr lang="en-US" smtClean="0"/>
-              <a:t>2/26/16</a:t>
+              <a:t>2/28/16</a:t>
             </a:fld>
             <a:endParaRPr lang="en-US"/>
           </a:p>
@@ -458,7 +459,7 @@
           <a:p>
             <a:fld id="{E5BFB0E3-31D7-3147-A5E0-5689882FCFEF}" type="datetimeFigureOut">
               <a:rPr lang="en-US" smtClean="0"/>
-              <a:t>2/26/16</a:t>
+              <a:t>2/28/16</a:t>
             </a:fld>
             <a:endParaRPr lang="en-US"/>
           </a:p>
@@ -638,7 +639,7 @@
           <a:p>
             <a:fld id="{E5BFB0E3-31D7-3147-A5E0-5689882FCFEF}" type="datetimeFigureOut">
               <a:rPr lang="en-US" smtClean="0"/>
-              <a:t>2/26/16</a:t>
+              <a:t>2/28/16</a:t>
             </a:fld>
             <a:endParaRPr lang="en-US"/>
           </a:p>
@@ -808,7 +809,7 @@
           <a:p>
             <a:fld id="{E5BFB0E3-31D7-3147-A5E0-5689882FCFEF}" type="datetimeFigureOut">
               <a:rPr lang="en-US" smtClean="0"/>
-              <a:t>2/26/16</a:t>
+              <a:t>2/28/16</a:t>
             </a:fld>
             <a:endParaRPr lang="en-US"/>
           </a:p>
@@ -1054,7 +1055,7 @@
           <a:p>
             <a:fld id="{E5BFB0E3-31D7-3147-A5E0-5689882FCFEF}" type="datetimeFigureOut">
               <a:rPr lang="en-US" smtClean="0"/>
-              <a:t>2/26/16</a:t>
+              <a:t>2/28/16</a:t>
             </a:fld>
             <a:endParaRPr lang="en-US"/>
           </a:p>
@@ -1342,7 +1343,7 @@
           <a:p>
             <a:fld id="{E5BFB0E3-31D7-3147-A5E0-5689882FCFEF}" type="datetimeFigureOut">
               <a:rPr lang="en-US" smtClean="0"/>
-              <a:t>2/26/16</a:t>
+              <a:t>2/28/16</a:t>
             </a:fld>
             <a:endParaRPr lang="en-US"/>
           </a:p>
@@ -1764,7 +1765,7 @@
           <a:p>
             <a:fld id="{E5BFB0E3-31D7-3147-A5E0-5689882FCFEF}" type="datetimeFigureOut">
               <a:rPr lang="en-US" smtClean="0"/>
-              <a:t>2/26/16</a:t>
+              <a:t>2/28/16</a:t>
             </a:fld>
             <a:endParaRPr lang="en-US"/>
           </a:p>
@@ -1882,7 +1883,7 @@
           <a:p>
             <a:fld id="{E5BFB0E3-31D7-3147-A5E0-5689882FCFEF}" type="datetimeFigureOut">
               <a:rPr lang="en-US" smtClean="0"/>
-              <a:t>2/26/16</a:t>
+              <a:t>2/28/16</a:t>
             </a:fld>
             <a:endParaRPr lang="en-US"/>
           </a:p>
@@ -1977,7 +1978,7 @@
           <a:p>
             <a:fld id="{E5BFB0E3-31D7-3147-A5E0-5689882FCFEF}" type="datetimeFigureOut">
               <a:rPr lang="en-US" smtClean="0"/>
-              <a:t>2/26/16</a:t>
+              <a:t>2/28/16</a:t>
             </a:fld>
             <a:endParaRPr lang="en-US"/>
           </a:p>
@@ -2254,7 +2255,7 @@
           <a:p>
             <a:fld id="{E5BFB0E3-31D7-3147-A5E0-5689882FCFEF}" type="datetimeFigureOut">
               <a:rPr lang="en-US" smtClean="0"/>
-              <a:t>2/26/16</a:t>
+              <a:t>2/28/16</a:t>
             </a:fld>
             <a:endParaRPr lang="en-US"/>
           </a:p>
@@ -2507,7 +2508,7 @@
           <a:p>
             <a:fld id="{E5BFB0E3-31D7-3147-A5E0-5689882FCFEF}" type="datetimeFigureOut">
               <a:rPr lang="en-US" smtClean="0"/>
-              <a:t>2/26/16</a:t>
+              <a:t>2/28/16</a:t>
             </a:fld>
             <a:endParaRPr lang="en-US"/>
           </a:p>
@@ -2720,7 +2721,7 @@
           <a:p>
             <a:fld id="{E5BFB0E3-31D7-3147-A5E0-5689882FCFEF}" type="datetimeFigureOut">
               <a:rPr lang="en-US" smtClean="0"/>
-              <a:t>2/26/16</a:t>
+              <a:t>2/28/16</a:t>
             </a:fld>
             <a:endParaRPr lang="en-US"/>
           </a:p>
@@ -3283,7 +3284,7 @@
         <p:spPr>
           <a:xfrm>
             <a:off x="59104" y="1796612"/>
-            <a:ext cx="2449258" cy="369332"/>
+            <a:ext cx="1329924" cy="369332"/>
           </a:xfrm>
           <a:prstGeom prst="rect">
             <a:avLst/>
@@ -3297,12 +3298,8 @@
           <a:lstStyle/>
           <a:p>
             <a:r>
-              <a:rPr lang="en-US" b="1" dirty="0" err="1" smtClean="0"/>
-              <a:t>no_input</a:t>
-            </a:r>
-            <a:r>
-              <a:rPr lang="en-US" dirty="0" smtClean="0"/>
-              <a:t> section option</a:t>
+              <a:rPr lang="en-US" b="1" dirty="0" smtClean="0"/>
+              <a:t>Input: None</a:t>
             </a:r>
             <a:endParaRPr lang="en-US" dirty="0"/>
           </a:p>
@@ -6842,19 +6839,7 @@
                 <a:latin typeface="Consolas"/>
                 <a:cs typeface="Consolas"/>
               </a:rPr>
-              <a:t>input: [</a:t>
-            </a:r>
-            <a:r>
-              <a:rPr lang="en-US" sz="1200" dirty="0" smtClean="0">
-                <a:solidFill>
-                  <a:schemeClr val="bg2">
-                    <a:lumMod val="50000"/>
-                  </a:schemeClr>
-                </a:solidFill>
-                <a:latin typeface="Consolas"/>
-                <a:cs typeface="Consolas"/>
-              </a:rPr>
-              <a:t>‘a1’,‘a2’]</a:t>
+              <a:t>input: [‘a1’,‘a2’]</a:t>
             </a:r>
             <a:endParaRPr lang="en-US" sz="1200" dirty="0"/>
           </a:p>
@@ -6986,6 +6971,2695 @@
     <p:extLst>
       <p:ext uri="{BB962C8B-B14F-4D97-AF65-F5344CB8AC3E}">
         <p14:creationId xmlns:p14="http://schemas.microsoft.com/office/powerpoint/2010/main" val="4006216338"/>
+      </p:ext>
+    </p:extLst>
+  </p:cSld>
+  <p:clrMapOvr>
+    <a:masterClrMapping/>
+  </p:clrMapOvr>
+  <p:timing>
+    <p:tnLst>
+      <p:par>
+        <p:cTn xmlns:p14="http://schemas.microsoft.com/office/powerpoint/2010/main" id="1" dur="indefinite" restart="never" nodeType="tmRoot"/>
+      </p:par>
+    </p:tnLst>
+  </p:timing>
+</p:sld>
+</file>
+
+<file path=ppt/slides/slide2.xml><?xml version="1.0" encoding="utf-8"?>
+<p:sld xmlns:a="http://schemas.openxmlformats.org/drawingml/2006/main" xmlns:r="http://schemas.openxmlformats.org/officeDocument/2006/relationships" xmlns:p="http://schemas.openxmlformats.org/presentationml/2006/main">
+  <p:cSld>
+    <p:bg>
+      <p:bgPr>
+        <a:solidFill>
+          <a:schemeClr val="bg1">
+            <a:lumMod val="85000"/>
+          </a:schemeClr>
+        </a:solidFill>
+        <a:effectLst/>
+      </p:bgPr>
+    </p:bg>
+    <p:spTree>
+      <p:nvGrpSpPr>
+        <p:cNvPr id="1" name=""/>
+        <p:cNvGrpSpPr/>
+        <p:nvPr/>
+      </p:nvGrpSpPr>
+      <p:grpSpPr>
+        <a:xfrm>
+          <a:off x="0" y="0"/>
+          <a:ext cx="0" cy="0"/>
+          <a:chOff x="0" y="0"/>
+          <a:chExt cx="0" cy="0"/>
+        </a:xfrm>
+      </p:grpSpPr>
+      <p:sp>
+        <p:nvSpPr>
+          <p:cNvPr id="5" name="TextBox 4"/>
+          <p:cNvSpPr txBox="1"/>
+          <p:nvPr/>
+        </p:nvSpPr>
+        <p:spPr>
+          <a:xfrm>
+            <a:off x="60326" y="-5959"/>
+            <a:ext cx="5021778" cy="369332"/>
+          </a:xfrm>
+          <a:prstGeom prst="rect">
+            <a:avLst/>
+          </a:prstGeom>
+          <a:noFill/>
+        </p:spPr>
+        <p:txBody>
+          <a:bodyPr wrap="none" rtlCol="0">
+            <a:spAutoFit/>
+          </a:bodyPr>
+          <a:lstStyle/>
+          <a:p>
+            <a:r>
+              <a:rPr lang="en-US" dirty="0" smtClean="0"/>
+              <a:t>Default workflow with no input or output directives</a:t>
+            </a:r>
+            <a:endParaRPr lang="en-US" dirty="0"/>
+          </a:p>
+        </p:txBody>
+      </p:sp>
+      <p:cxnSp>
+        <p:nvCxnSpPr>
+          <p:cNvPr id="116" name="Straight Connector 115"/>
+          <p:cNvCxnSpPr/>
+          <p:nvPr/>
+        </p:nvCxnSpPr>
+        <p:spPr>
+          <a:xfrm>
+            <a:off x="2903074" y="2535384"/>
+            <a:ext cx="6303818" cy="0"/>
+          </a:xfrm>
+          <a:prstGeom prst="line">
+            <a:avLst/>
+          </a:prstGeom>
+          <a:ln w="9525" cmpd="sng">
+            <a:solidFill>
+              <a:schemeClr val="bg2"/>
+            </a:solidFill>
+            <a:prstDash val="sysDot"/>
+          </a:ln>
+        </p:spPr>
+        <p:style>
+          <a:lnRef idx="1">
+            <a:schemeClr val="accent3"/>
+          </a:lnRef>
+          <a:fillRef idx="0">
+            <a:schemeClr val="accent3"/>
+          </a:fillRef>
+          <a:effectRef idx="0">
+            <a:schemeClr val="accent3"/>
+          </a:effectRef>
+          <a:fontRef idx="minor">
+            <a:schemeClr val="tx1"/>
+          </a:fontRef>
+        </p:style>
+      </p:cxnSp>
+      <p:cxnSp>
+        <p:nvCxnSpPr>
+          <p:cNvPr id="119" name="Straight Connector 118"/>
+          <p:cNvCxnSpPr/>
+          <p:nvPr/>
+        </p:nvCxnSpPr>
+        <p:spPr>
+          <a:xfrm>
+            <a:off x="0" y="1449817"/>
+            <a:ext cx="9144000" cy="0"/>
+          </a:xfrm>
+          <a:prstGeom prst="line">
+            <a:avLst/>
+          </a:prstGeom>
+          <a:ln w="9525" cmpd="sng">
+            <a:solidFill>
+              <a:schemeClr val="bg2"/>
+            </a:solidFill>
+            <a:prstDash val="sysDot"/>
+          </a:ln>
+        </p:spPr>
+        <p:style>
+          <a:lnRef idx="2">
+            <a:schemeClr val="accent3"/>
+          </a:lnRef>
+          <a:fillRef idx="0">
+            <a:schemeClr val="accent3"/>
+          </a:fillRef>
+          <a:effectRef idx="1">
+            <a:schemeClr val="accent3"/>
+          </a:effectRef>
+          <a:fontRef idx="minor">
+            <a:schemeClr val="tx1"/>
+          </a:fontRef>
+        </p:style>
+      </p:cxnSp>
+      <p:sp>
+        <p:nvSpPr>
+          <p:cNvPr id="128" name="Process 127"/>
+          <p:cNvSpPr/>
+          <p:nvPr/>
+        </p:nvSpPr>
+        <p:spPr>
+          <a:xfrm>
+            <a:off x="1796424" y="595899"/>
+            <a:ext cx="765314" cy="584258"/>
+          </a:xfrm>
+          <a:prstGeom prst="flowChartProcess">
+            <a:avLst/>
+          </a:prstGeom>
+          <a:noFill/>
+        </p:spPr>
+        <p:style>
+          <a:lnRef idx="1">
+            <a:schemeClr val="accent3"/>
+          </a:lnRef>
+          <a:fillRef idx="2">
+            <a:schemeClr val="accent3"/>
+          </a:fillRef>
+          <a:effectRef idx="1">
+            <a:schemeClr val="accent3"/>
+          </a:effectRef>
+          <a:fontRef idx="minor">
+            <a:schemeClr val="dk1"/>
+          </a:fontRef>
+        </p:style>
+        <p:txBody>
+          <a:bodyPr rtlCol="0" anchor="ctr"/>
+          <a:lstStyle/>
+          <a:p>
+            <a:pPr algn="ctr"/>
+            <a:r>
+              <a:rPr lang="en-US" dirty="0" smtClean="0"/>
+              <a:t>Step 1</a:t>
+            </a:r>
+            <a:endParaRPr lang="en-US" dirty="0"/>
+          </a:p>
+        </p:txBody>
+      </p:sp>
+      <p:cxnSp>
+        <p:nvCxnSpPr>
+          <p:cNvPr id="129" name="Straight Connector 128"/>
+          <p:cNvCxnSpPr>
+            <a:endCxn id="130" idx="1"/>
+          </p:cNvCxnSpPr>
+          <p:nvPr/>
+        </p:nvCxnSpPr>
+        <p:spPr>
+          <a:xfrm>
+            <a:off x="2592030" y="882214"/>
+            <a:ext cx="960790" cy="5814"/>
+          </a:xfrm>
+          <a:prstGeom prst="line">
+            <a:avLst/>
+          </a:prstGeom>
+          <a:ln w="12700" cmpd="sng">
+            <a:tailEnd type="triangle" w="lg"/>
+          </a:ln>
+        </p:spPr>
+        <p:style>
+          <a:lnRef idx="2">
+            <a:schemeClr val="accent3"/>
+          </a:lnRef>
+          <a:fillRef idx="0">
+            <a:schemeClr val="accent3"/>
+          </a:fillRef>
+          <a:effectRef idx="1">
+            <a:schemeClr val="accent3"/>
+          </a:effectRef>
+          <a:fontRef idx="minor">
+            <a:schemeClr val="tx1"/>
+          </a:fontRef>
+        </p:style>
+      </p:cxnSp>
+      <p:sp>
+        <p:nvSpPr>
+          <p:cNvPr id="130" name="Process 129"/>
+          <p:cNvSpPr/>
+          <p:nvPr/>
+        </p:nvSpPr>
+        <p:spPr>
+          <a:xfrm>
+            <a:off x="3552820" y="595899"/>
+            <a:ext cx="765314" cy="584258"/>
+          </a:xfrm>
+          <a:prstGeom prst="flowChartProcess">
+            <a:avLst/>
+          </a:prstGeom>
+          <a:noFill/>
+        </p:spPr>
+        <p:style>
+          <a:lnRef idx="1">
+            <a:schemeClr val="accent3"/>
+          </a:lnRef>
+          <a:fillRef idx="2">
+            <a:schemeClr val="accent3"/>
+          </a:fillRef>
+          <a:effectRef idx="1">
+            <a:schemeClr val="accent3"/>
+          </a:effectRef>
+          <a:fontRef idx="minor">
+            <a:schemeClr val="dk1"/>
+          </a:fontRef>
+        </p:style>
+        <p:txBody>
+          <a:bodyPr rtlCol="0" anchor="ctr"/>
+          <a:lstStyle/>
+          <a:p>
+            <a:pPr algn="ctr"/>
+            <a:r>
+              <a:rPr lang="en-US" dirty="0" smtClean="0"/>
+              <a:t>Step 2</a:t>
+            </a:r>
+            <a:endParaRPr lang="en-US" dirty="0"/>
+          </a:p>
+        </p:txBody>
+      </p:sp>
+      <p:sp>
+        <p:nvSpPr>
+          <p:cNvPr id="132" name="Process 131"/>
+          <p:cNvSpPr/>
+          <p:nvPr/>
+        </p:nvSpPr>
+        <p:spPr>
+          <a:xfrm>
+            <a:off x="7191372" y="595899"/>
+            <a:ext cx="765314" cy="584258"/>
+          </a:xfrm>
+          <a:prstGeom prst="flowChartProcess">
+            <a:avLst/>
+          </a:prstGeom>
+          <a:noFill/>
+        </p:spPr>
+        <p:style>
+          <a:lnRef idx="1">
+            <a:schemeClr val="accent3"/>
+          </a:lnRef>
+          <a:fillRef idx="2">
+            <a:schemeClr val="accent3"/>
+          </a:fillRef>
+          <a:effectRef idx="1">
+            <a:schemeClr val="accent3"/>
+          </a:effectRef>
+          <a:fontRef idx="minor">
+            <a:schemeClr val="dk1"/>
+          </a:fontRef>
+        </p:style>
+        <p:txBody>
+          <a:bodyPr rtlCol="0" anchor="ctr"/>
+          <a:lstStyle/>
+          <a:p>
+            <a:pPr algn="ctr"/>
+            <a:r>
+              <a:rPr lang="en-US" dirty="0" smtClean="0"/>
+              <a:t>Step 4</a:t>
+            </a:r>
+            <a:endParaRPr lang="en-US" dirty="0"/>
+          </a:p>
+        </p:txBody>
+      </p:sp>
+      <p:sp>
+        <p:nvSpPr>
+          <p:cNvPr id="134" name="Process 133"/>
+          <p:cNvSpPr/>
+          <p:nvPr/>
+        </p:nvSpPr>
+        <p:spPr>
+          <a:xfrm>
+            <a:off x="5390127" y="592332"/>
+            <a:ext cx="765314" cy="584258"/>
+          </a:xfrm>
+          <a:prstGeom prst="flowChartProcess">
+            <a:avLst/>
+          </a:prstGeom>
+          <a:noFill/>
+        </p:spPr>
+        <p:style>
+          <a:lnRef idx="1">
+            <a:schemeClr val="accent3"/>
+          </a:lnRef>
+          <a:fillRef idx="2">
+            <a:schemeClr val="accent3"/>
+          </a:fillRef>
+          <a:effectRef idx="1">
+            <a:schemeClr val="accent3"/>
+          </a:effectRef>
+          <a:fontRef idx="minor">
+            <a:schemeClr val="dk1"/>
+          </a:fontRef>
+        </p:style>
+        <p:txBody>
+          <a:bodyPr rtlCol="0" anchor="ctr"/>
+          <a:lstStyle/>
+          <a:p>
+            <a:pPr algn="ctr"/>
+            <a:r>
+              <a:rPr lang="en-US" dirty="0" smtClean="0"/>
+              <a:t>Step 3</a:t>
+            </a:r>
+            <a:endParaRPr lang="en-US" dirty="0"/>
+          </a:p>
+        </p:txBody>
+      </p:sp>
+      <p:sp>
+        <p:nvSpPr>
+          <p:cNvPr id="138" name="TextBox 137"/>
+          <p:cNvSpPr txBox="1"/>
+          <p:nvPr/>
+        </p:nvSpPr>
+        <p:spPr>
+          <a:xfrm>
+            <a:off x="160740" y="1602153"/>
+            <a:ext cx="3986751" cy="369332"/>
+          </a:xfrm>
+          <a:prstGeom prst="rect">
+            <a:avLst/>
+          </a:prstGeom>
+          <a:noFill/>
+        </p:spPr>
+        <p:txBody>
+          <a:bodyPr wrap="none" rtlCol="0">
+            <a:spAutoFit/>
+          </a:bodyPr>
+          <a:lstStyle/>
+          <a:p>
+            <a:r>
+              <a:rPr lang="en-US" dirty="0" smtClean="0"/>
+              <a:t>Workflow with defined input and output</a:t>
+            </a:r>
+            <a:endParaRPr lang="en-US" dirty="0"/>
+          </a:p>
+        </p:txBody>
+      </p:sp>
+      <p:sp>
+        <p:nvSpPr>
+          <p:cNvPr id="139" name="Process 138"/>
+          <p:cNvSpPr/>
+          <p:nvPr/>
+        </p:nvSpPr>
+        <p:spPr>
+          <a:xfrm>
+            <a:off x="1844149" y="2243255"/>
+            <a:ext cx="765314" cy="584258"/>
+          </a:xfrm>
+          <a:prstGeom prst="flowChartProcess">
+            <a:avLst/>
+          </a:prstGeom>
+          <a:noFill/>
+        </p:spPr>
+        <p:style>
+          <a:lnRef idx="1">
+            <a:schemeClr val="accent3"/>
+          </a:lnRef>
+          <a:fillRef idx="2">
+            <a:schemeClr val="accent3"/>
+          </a:fillRef>
+          <a:effectRef idx="1">
+            <a:schemeClr val="accent3"/>
+          </a:effectRef>
+          <a:fontRef idx="minor">
+            <a:schemeClr val="dk1"/>
+          </a:fontRef>
+        </p:style>
+        <p:txBody>
+          <a:bodyPr rtlCol="0" anchor="ctr"/>
+          <a:lstStyle/>
+          <a:p>
+            <a:pPr algn="ctr"/>
+            <a:r>
+              <a:rPr lang="en-US" dirty="0" smtClean="0"/>
+              <a:t>Step 1</a:t>
+            </a:r>
+            <a:endParaRPr lang="en-US" dirty="0"/>
+          </a:p>
+        </p:txBody>
+      </p:sp>
+      <p:sp>
+        <p:nvSpPr>
+          <p:cNvPr id="148" name="Rectangle 147"/>
+          <p:cNvSpPr/>
+          <p:nvPr/>
+        </p:nvSpPr>
+        <p:spPr>
+          <a:xfrm>
+            <a:off x="2618575" y="2417327"/>
+            <a:ext cx="339782" cy="261610"/>
+          </a:xfrm>
+          <a:prstGeom prst="rect">
+            <a:avLst/>
+          </a:prstGeom>
+        </p:spPr>
+        <p:txBody>
+          <a:bodyPr wrap="none">
+            <a:spAutoFit/>
+          </a:bodyPr>
+          <a:lstStyle/>
+          <a:p>
+            <a:r>
+              <a:rPr lang="en-US" sz="1100" dirty="0" smtClean="0">
+                <a:solidFill>
+                  <a:schemeClr val="bg2">
+                    <a:lumMod val="50000"/>
+                  </a:schemeClr>
+                </a:solidFill>
+                <a:latin typeface="Consolas"/>
+                <a:cs typeface="Consolas"/>
+              </a:rPr>
+              <a:t>a1</a:t>
+            </a:r>
+            <a:endParaRPr lang="en-US" sz="1100" dirty="0"/>
+          </a:p>
+        </p:txBody>
+      </p:sp>
+      <p:sp>
+        <p:nvSpPr>
+          <p:cNvPr id="159" name="Rectangle 158"/>
+          <p:cNvSpPr/>
+          <p:nvPr/>
+        </p:nvSpPr>
+        <p:spPr>
+          <a:xfrm>
+            <a:off x="1338662" y="3856668"/>
+            <a:ext cx="494897" cy="261610"/>
+          </a:xfrm>
+          <a:prstGeom prst="rect">
+            <a:avLst/>
+          </a:prstGeom>
+        </p:spPr>
+        <p:txBody>
+          <a:bodyPr wrap="none">
+            <a:spAutoFit/>
+          </a:bodyPr>
+          <a:lstStyle/>
+          <a:p>
+            <a:r>
+              <a:rPr lang="en-US" sz="1100" dirty="0" smtClean="0">
+                <a:solidFill>
+                  <a:schemeClr val="bg2">
+                    <a:lumMod val="50000"/>
+                  </a:schemeClr>
+                </a:solidFill>
+                <a:latin typeface="Consolas"/>
+                <a:cs typeface="Consolas"/>
+              </a:rPr>
+              <a:t>None</a:t>
+            </a:r>
+            <a:endParaRPr lang="en-US" sz="1100" dirty="0"/>
+          </a:p>
+        </p:txBody>
+      </p:sp>
+      <p:sp>
+        <p:nvSpPr>
+          <p:cNvPr id="160" name="Rectangle 159"/>
+          <p:cNvSpPr/>
+          <p:nvPr/>
+        </p:nvSpPr>
+        <p:spPr>
+          <a:xfrm>
+            <a:off x="4355269" y="2404579"/>
+            <a:ext cx="339782" cy="261610"/>
+          </a:xfrm>
+          <a:prstGeom prst="rect">
+            <a:avLst/>
+          </a:prstGeom>
+        </p:spPr>
+        <p:txBody>
+          <a:bodyPr wrap="none">
+            <a:spAutoFit/>
+          </a:bodyPr>
+          <a:lstStyle/>
+          <a:p>
+            <a:r>
+              <a:rPr lang="en-US" sz="1100" dirty="0" smtClean="0">
+                <a:solidFill>
+                  <a:schemeClr val="bg2">
+                    <a:lumMod val="50000"/>
+                  </a:schemeClr>
+                </a:solidFill>
+                <a:latin typeface="Consolas"/>
+                <a:cs typeface="Consolas"/>
+              </a:rPr>
+              <a:t>a2</a:t>
+            </a:r>
+            <a:endParaRPr lang="en-US" sz="1100" dirty="0"/>
+          </a:p>
+        </p:txBody>
+      </p:sp>
+      <p:sp>
+        <p:nvSpPr>
+          <p:cNvPr id="161" name="Rectangle 160"/>
+          <p:cNvSpPr/>
+          <p:nvPr/>
+        </p:nvSpPr>
+        <p:spPr>
+          <a:xfrm>
+            <a:off x="5192976" y="2393244"/>
+            <a:ext cx="339782" cy="261610"/>
+          </a:xfrm>
+          <a:prstGeom prst="rect">
+            <a:avLst/>
+          </a:prstGeom>
+        </p:spPr>
+        <p:txBody>
+          <a:bodyPr wrap="none">
+            <a:spAutoFit/>
+          </a:bodyPr>
+          <a:lstStyle/>
+          <a:p>
+            <a:r>
+              <a:rPr lang="en-US" sz="1100" dirty="0" smtClean="0">
+                <a:solidFill>
+                  <a:schemeClr val="bg2">
+                    <a:lumMod val="50000"/>
+                  </a:schemeClr>
+                </a:solidFill>
+                <a:latin typeface="Consolas"/>
+                <a:cs typeface="Consolas"/>
+              </a:rPr>
+              <a:t>a1</a:t>
+            </a:r>
+            <a:endParaRPr lang="en-US" sz="1100" dirty="0"/>
+          </a:p>
+        </p:txBody>
+      </p:sp>
+      <p:cxnSp>
+        <p:nvCxnSpPr>
+          <p:cNvPr id="163" name="Straight Connector 162"/>
+          <p:cNvCxnSpPr>
+            <a:endCxn id="134" idx="1"/>
+          </p:cNvCxnSpPr>
+          <p:nvPr/>
+        </p:nvCxnSpPr>
+        <p:spPr>
+          <a:xfrm flipV="1">
+            <a:off x="4357331" y="884461"/>
+            <a:ext cx="1032796" cy="15831"/>
+          </a:xfrm>
+          <a:prstGeom prst="line">
+            <a:avLst/>
+          </a:prstGeom>
+          <a:ln w="12700" cmpd="sng">
+            <a:tailEnd type="triangle" w="lg"/>
+          </a:ln>
+        </p:spPr>
+        <p:style>
+          <a:lnRef idx="2">
+            <a:schemeClr val="accent3"/>
+          </a:lnRef>
+          <a:fillRef idx="0">
+            <a:schemeClr val="accent3"/>
+          </a:fillRef>
+          <a:effectRef idx="1">
+            <a:schemeClr val="accent3"/>
+          </a:effectRef>
+          <a:fontRef idx="minor">
+            <a:schemeClr val="tx1"/>
+          </a:fontRef>
+        </p:style>
+      </p:cxnSp>
+      <p:cxnSp>
+        <p:nvCxnSpPr>
+          <p:cNvPr id="164" name="Straight Connector 163"/>
+          <p:cNvCxnSpPr>
+            <a:endCxn id="132" idx="1"/>
+          </p:cNvCxnSpPr>
+          <p:nvPr/>
+        </p:nvCxnSpPr>
+        <p:spPr>
+          <a:xfrm flipV="1">
+            <a:off x="6173873" y="888028"/>
+            <a:ext cx="1017499" cy="8061"/>
+          </a:xfrm>
+          <a:prstGeom prst="line">
+            <a:avLst/>
+          </a:prstGeom>
+          <a:ln w="12700" cmpd="sng">
+            <a:tailEnd type="triangle" w="lg"/>
+          </a:ln>
+        </p:spPr>
+        <p:style>
+          <a:lnRef idx="2">
+            <a:schemeClr val="accent3"/>
+          </a:lnRef>
+          <a:fillRef idx="0">
+            <a:schemeClr val="accent3"/>
+          </a:fillRef>
+          <a:effectRef idx="1">
+            <a:schemeClr val="accent3"/>
+          </a:effectRef>
+          <a:fontRef idx="minor">
+            <a:schemeClr val="tx1"/>
+          </a:fontRef>
+        </p:style>
+      </p:cxnSp>
+      <p:sp>
+        <p:nvSpPr>
+          <p:cNvPr id="165" name="Process 164"/>
+          <p:cNvSpPr/>
+          <p:nvPr/>
+        </p:nvSpPr>
+        <p:spPr>
+          <a:xfrm>
+            <a:off x="3649321" y="2277291"/>
+            <a:ext cx="765314" cy="584258"/>
+          </a:xfrm>
+          <a:prstGeom prst="flowChartProcess">
+            <a:avLst/>
+          </a:prstGeom>
+          <a:noFill/>
+        </p:spPr>
+        <p:style>
+          <a:lnRef idx="1">
+            <a:schemeClr val="accent3"/>
+          </a:lnRef>
+          <a:fillRef idx="2">
+            <a:schemeClr val="accent3"/>
+          </a:fillRef>
+          <a:effectRef idx="1">
+            <a:schemeClr val="accent3"/>
+          </a:effectRef>
+          <a:fontRef idx="minor">
+            <a:schemeClr val="dk1"/>
+          </a:fontRef>
+        </p:style>
+        <p:txBody>
+          <a:bodyPr rtlCol="0" anchor="ctr"/>
+          <a:lstStyle/>
+          <a:p>
+            <a:pPr algn="ctr"/>
+            <a:r>
+              <a:rPr lang="en-US" dirty="0" smtClean="0"/>
+              <a:t>Step 2</a:t>
+            </a:r>
+            <a:endParaRPr lang="en-US" dirty="0"/>
+          </a:p>
+        </p:txBody>
+      </p:sp>
+      <p:sp>
+        <p:nvSpPr>
+          <p:cNvPr id="166" name="Process 165"/>
+          <p:cNvSpPr/>
+          <p:nvPr/>
+        </p:nvSpPr>
+        <p:spPr>
+          <a:xfrm>
+            <a:off x="7287873" y="2277291"/>
+            <a:ext cx="765314" cy="584258"/>
+          </a:xfrm>
+          <a:prstGeom prst="flowChartProcess">
+            <a:avLst/>
+          </a:prstGeom>
+          <a:noFill/>
+        </p:spPr>
+        <p:style>
+          <a:lnRef idx="1">
+            <a:schemeClr val="accent3"/>
+          </a:lnRef>
+          <a:fillRef idx="2">
+            <a:schemeClr val="accent3"/>
+          </a:fillRef>
+          <a:effectRef idx="1">
+            <a:schemeClr val="accent3"/>
+          </a:effectRef>
+          <a:fontRef idx="minor">
+            <a:schemeClr val="dk1"/>
+          </a:fontRef>
+        </p:style>
+        <p:txBody>
+          <a:bodyPr rtlCol="0" anchor="ctr"/>
+          <a:lstStyle/>
+          <a:p>
+            <a:pPr algn="ctr"/>
+            <a:r>
+              <a:rPr lang="en-US" dirty="0" smtClean="0"/>
+              <a:t>Step 4</a:t>
+            </a:r>
+            <a:endParaRPr lang="en-US" dirty="0"/>
+          </a:p>
+        </p:txBody>
+      </p:sp>
+      <p:sp>
+        <p:nvSpPr>
+          <p:cNvPr id="167" name="Process 166"/>
+          <p:cNvSpPr/>
+          <p:nvPr/>
+        </p:nvSpPr>
+        <p:spPr>
+          <a:xfrm>
+            <a:off x="5486628" y="2273724"/>
+            <a:ext cx="765314" cy="584258"/>
+          </a:xfrm>
+          <a:prstGeom prst="flowChartProcess">
+            <a:avLst/>
+          </a:prstGeom>
+          <a:noFill/>
+        </p:spPr>
+        <p:style>
+          <a:lnRef idx="1">
+            <a:schemeClr val="accent3"/>
+          </a:lnRef>
+          <a:fillRef idx="2">
+            <a:schemeClr val="accent3"/>
+          </a:fillRef>
+          <a:effectRef idx="1">
+            <a:schemeClr val="accent3"/>
+          </a:effectRef>
+          <a:fontRef idx="minor">
+            <a:schemeClr val="dk1"/>
+          </a:fontRef>
+        </p:style>
+        <p:txBody>
+          <a:bodyPr rtlCol="0" anchor="ctr"/>
+          <a:lstStyle/>
+          <a:p>
+            <a:pPr algn="ctr"/>
+            <a:r>
+              <a:rPr lang="en-US" dirty="0" smtClean="0"/>
+              <a:t>Step 3</a:t>
+            </a:r>
+            <a:endParaRPr lang="en-US" dirty="0"/>
+          </a:p>
+        </p:txBody>
+      </p:sp>
+      <p:cxnSp>
+        <p:nvCxnSpPr>
+          <p:cNvPr id="169" name="Straight Connector 168"/>
+          <p:cNvCxnSpPr>
+            <a:stCxn id="171" idx="3"/>
+            <a:endCxn id="172" idx="1"/>
+          </p:cNvCxnSpPr>
+          <p:nvPr/>
+        </p:nvCxnSpPr>
+        <p:spPr>
+          <a:xfrm>
+            <a:off x="6615940" y="2588816"/>
+            <a:ext cx="332151" cy="0"/>
+          </a:xfrm>
+          <a:prstGeom prst="line">
+            <a:avLst/>
+          </a:prstGeom>
+          <a:ln w="12700" cmpd="sng">
+            <a:tailEnd type="triangle" w="lg"/>
+          </a:ln>
+        </p:spPr>
+        <p:style>
+          <a:lnRef idx="2">
+            <a:schemeClr val="accent3"/>
+          </a:lnRef>
+          <a:fillRef idx="0">
+            <a:schemeClr val="accent3"/>
+          </a:fillRef>
+          <a:effectRef idx="1">
+            <a:schemeClr val="accent3"/>
+          </a:effectRef>
+          <a:fontRef idx="minor">
+            <a:schemeClr val="tx1"/>
+          </a:fontRef>
+        </p:style>
+      </p:cxnSp>
+      <p:cxnSp>
+        <p:nvCxnSpPr>
+          <p:cNvPr id="170" name="Straight Connector 169"/>
+          <p:cNvCxnSpPr/>
+          <p:nvPr/>
+        </p:nvCxnSpPr>
+        <p:spPr>
+          <a:xfrm flipV="1">
+            <a:off x="2996475" y="2577482"/>
+            <a:ext cx="593480" cy="11334"/>
+          </a:xfrm>
+          <a:prstGeom prst="line">
+            <a:avLst/>
+          </a:prstGeom>
+          <a:ln w="12700" cmpd="sng">
+            <a:tailEnd type="triangle" w="lg"/>
+          </a:ln>
+        </p:spPr>
+        <p:style>
+          <a:lnRef idx="2">
+            <a:schemeClr val="accent3"/>
+          </a:lnRef>
+          <a:fillRef idx="0">
+            <a:schemeClr val="accent3"/>
+          </a:fillRef>
+          <a:effectRef idx="1">
+            <a:schemeClr val="accent3"/>
+          </a:effectRef>
+          <a:fontRef idx="minor">
+            <a:schemeClr val="tx1"/>
+          </a:fontRef>
+        </p:style>
+      </p:cxnSp>
+      <p:sp>
+        <p:nvSpPr>
+          <p:cNvPr id="171" name="Rectangle 170"/>
+          <p:cNvSpPr/>
+          <p:nvPr/>
+        </p:nvSpPr>
+        <p:spPr>
+          <a:xfrm>
+            <a:off x="6276158" y="2458011"/>
+            <a:ext cx="339782" cy="261610"/>
+          </a:xfrm>
+          <a:prstGeom prst="rect">
+            <a:avLst/>
+          </a:prstGeom>
+        </p:spPr>
+        <p:txBody>
+          <a:bodyPr wrap="none">
+            <a:spAutoFit/>
+          </a:bodyPr>
+          <a:lstStyle/>
+          <a:p>
+            <a:r>
+              <a:rPr lang="en-US" sz="1100" dirty="0" smtClean="0">
+                <a:solidFill>
+                  <a:schemeClr val="bg2">
+                    <a:lumMod val="50000"/>
+                  </a:schemeClr>
+                </a:solidFill>
+                <a:latin typeface="Consolas"/>
+                <a:cs typeface="Consolas"/>
+              </a:rPr>
+              <a:t>a3</a:t>
+            </a:r>
+            <a:endParaRPr lang="en-US" sz="1100" dirty="0"/>
+          </a:p>
+        </p:txBody>
+      </p:sp>
+      <p:sp>
+        <p:nvSpPr>
+          <p:cNvPr id="172" name="Rectangle 171"/>
+          <p:cNvSpPr/>
+          <p:nvPr/>
+        </p:nvSpPr>
+        <p:spPr>
+          <a:xfrm>
+            <a:off x="6948091" y="2373372"/>
+            <a:ext cx="339782" cy="430887"/>
+          </a:xfrm>
+          <a:prstGeom prst="rect">
+            <a:avLst/>
+          </a:prstGeom>
+        </p:spPr>
+        <p:txBody>
+          <a:bodyPr wrap="none">
+            <a:spAutoFit/>
+          </a:bodyPr>
+          <a:lstStyle/>
+          <a:p>
+            <a:r>
+              <a:rPr lang="en-US" sz="1100" dirty="0" smtClean="0">
+                <a:solidFill>
+                  <a:schemeClr val="bg2">
+                    <a:lumMod val="50000"/>
+                  </a:schemeClr>
+                </a:solidFill>
+                <a:latin typeface="Consolas"/>
+                <a:cs typeface="Consolas"/>
+              </a:rPr>
+              <a:t>a2</a:t>
+            </a:r>
+          </a:p>
+          <a:p>
+            <a:r>
+              <a:rPr lang="en-US" sz="1100" dirty="0" smtClean="0">
+                <a:solidFill>
+                  <a:schemeClr val="bg2">
+                    <a:lumMod val="50000"/>
+                  </a:schemeClr>
+                </a:solidFill>
+                <a:latin typeface="Consolas"/>
+                <a:cs typeface="Consolas"/>
+              </a:rPr>
+              <a:t>a3</a:t>
+            </a:r>
+            <a:endParaRPr lang="en-US" sz="1100" dirty="0"/>
+          </a:p>
+        </p:txBody>
+      </p:sp>
+      <p:cxnSp>
+        <p:nvCxnSpPr>
+          <p:cNvPr id="173" name="Curved Connector 172"/>
+          <p:cNvCxnSpPr>
+            <a:stCxn id="148" idx="2"/>
+            <a:endCxn id="161" idx="2"/>
+          </p:cNvCxnSpPr>
+          <p:nvPr/>
+        </p:nvCxnSpPr>
+        <p:spPr>
+          <a:xfrm rot="5400000" flipH="1" flipV="1">
+            <a:off x="4063624" y="1379695"/>
+            <a:ext cx="24083" cy="2574401"/>
+          </a:xfrm>
+          <a:prstGeom prst="curvedConnector3">
+            <a:avLst>
+              <a:gd name="adj1" fmla="val -2275319"/>
+            </a:avLst>
+          </a:prstGeom>
+          <a:ln w="12700" cmpd="sng">
+            <a:tailEnd type="triangle"/>
+          </a:ln>
+        </p:spPr>
+        <p:style>
+          <a:lnRef idx="2">
+            <a:schemeClr val="accent3"/>
+          </a:lnRef>
+          <a:fillRef idx="0">
+            <a:schemeClr val="accent3"/>
+          </a:fillRef>
+          <a:effectRef idx="1">
+            <a:schemeClr val="accent3"/>
+          </a:effectRef>
+          <a:fontRef idx="minor">
+            <a:schemeClr val="tx1"/>
+          </a:fontRef>
+        </p:style>
+      </p:cxnSp>
+      <p:cxnSp>
+        <p:nvCxnSpPr>
+          <p:cNvPr id="196" name="Curved Connector 195"/>
+          <p:cNvCxnSpPr/>
+          <p:nvPr/>
+        </p:nvCxnSpPr>
+        <p:spPr>
+          <a:xfrm rot="5400000" flipH="1" flipV="1">
+            <a:off x="5776410" y="1082451"/>
+            <a:ext cx="24083" cy="2574401"/>
+          </a:xfrm>
+          <a:prstGeom prst="curvedConnector3">
+            <a:avLst>
+              <a:gd name="adj1" fmla="val 1795507"/>
+            </a:avLst>
+          </a:prstGeom>
+          <a:ln w="12700" cmpd="sng">
+            <a:tailEnd type="triangle"/>
+          </a:ln>
+        </p:spPr>
+        <p:style>
+          <a:lnRef idx="2">
+            <a:schemeClr val="accent3"/>
+          </a:lnRef>
+          <a:fillRef idx="0">
+            <a:schemeClr val="accent3"/>
+          </a:fillRef>
+          <a:effectRef idx="1">
+            <a:schemeClr val="accent3"/>
+          </a:effectRef>
+          <a:fontRef idx="minor">
+            <a:schemeClr val="tx1"/>
+          </a:fontRef>
+        </p:style>
+      </p:cxnSp>
+      <p:sp>
+        <p:nvSpPr>
+          <p:cNvPr id="241" name="Process 240"/>
+          <p:cNvSpPr/>
+          <p:nvPr/>
+        </p:nvSpPr>
+        <p:spPr>
+          <a:xfrm>
+            <a:off x="1862863" y="3725088"/>
+            <a:ext cx="765314" cy="584258"/>
+          </a:xfrm>
+          <a:prstGeom prst="flowChartProcess">
+            <a:avLst/>
+          </a:prstGeom>
+          <a:noFill/>
+        </p:spPr>
+        <p:style>
+          <a:lnRef idx="1">
+            <a:schemeClr val="accent3"/>
+          </a:lnRef>
+          <a:fillRef idx="2">
+            <a:schemeClr val="accent3"/>
+          </a:fillRef>
+          <a:effectRef idx="1">
+            <a:schemeClr val="accent3"/>
+          </a:effectRef>
+          <a:fontRef idx="minor">
+            <a:schemeClr val="dk1"/>
+          </a:fontRef>
+        </p:style>
+        <p:txBody>
+          <a:bodyPr rtlCol="0" anchor="ctr"/>
+          <a:lstStyle/>
+          <a:p>
+            <a:pPr algn="ctr"/>
+            <a:r>
+              <a:rPr lang="en-US" dirty="0" smtClean="0"/>
+              <a:t>Step 5</a:t>
+            </a:r>
+            <a:endParaRPr lang="en-US" dirty="0"/>
+          </a:p>
+        </p:txBody>
+      </p:sp>
+      <p:sp>
+        <p:nvSpPr>
+          <p:cNvPr id="242" name="Rectangle 241"/>
+          <p:cNvSpPr/>
+          <p:nvPr/>
+        </p:nvSpPr>
+        <p:spPr>
+          <a:xfrm>
+            <a:off x="2637289" y="3899160"/>
+            <a:ext cx="339782" cy="261610"/>
+          </a:xfrm>
+          <a:prstGeom prst="rect">
+            <a:avLst/>
+          </a:prstGeom>
+        </p:spPr>
+        <p:txBody>
+          <a:bodyPr wrap="none">
+            <a:spAutoFit/>
+          </a:bodyPr>
+          <a:lstStyle/>
+          <a:p>
+            <a:r>
+              <a:rPr lang="en-US" sz="1100" dirty="0" smtClean="0">
+                <a:solidFill>
+                  <a:schemeClr val="bg2">
+                    <a:lumMod val="50000"/>
+                  </a:schemeClr>
+                </a:solidFill>
+                <a:latin typeface="Consolas"/>
+                <a:cs typeface="Consolas"/>
+              </a:rPr>
+              <a:t>a6</a:t>
+            </a:r>
+            <a:endParaRPr lang="en-US" sz="1100" dirty="0"/>
+          </a:p>
+        </p:txBody>
+      </p:sp>
+      <p:sp>
+        <p:nvSpPr>
+          <p:cNvPr id="244" name="Rectangle 243"/>
+          <p:cNvSpPr/>
+          <p:nvPr/>
+        </p:nvSpPr>
+        <p:spPr>
+          <a:xfrm>
+            <a:off x="5115497" y="3814521"/>
+            <a:ext cx="339782" cy="430887"/>
+          </a:xfrm>
+          <a:prstGeom prst="rect">
+            <a:avLst/>
+          </a:prstGeom>
+        </p:spPr>
+        <p:txBody>
+          <a:bodyPr wrap="none">
+            <a:spAutoFit/>
+          </a:bodyPr>
+          <a:lstStyle/>
+          <a:p>
+            <a:r>
+              <a:rPr lang="en-US" sz="1100" dirty="0" smtClean="0">
+                <a:solidFill>
+                  <a:schemeClr val="bg2">
+                    <a:lumMod val="50000"/>
+                  </a:schemeClr>
+                </a:solidFill>
+                <a:latin typeface="Consolas"/>
+                <a:cs typeface="Consolas"/>
+              </a:rPr>
+              <a:t>a2</a:t>
+            </a:r>
+          </a:p>
+          <a:p>
+            <a:r>
+              <a:rPr lang="en-US" sz="1100" dirty="0" smtClean="0">
+                <a:solidFill>
+                  <a:schemeClr val="bg2">
+                    <a:lumMod val="50000"/>
+                  </a:schemeClr>
+                </a:solidFill>
+                <a:latin typeface="Consolas"/>
+                <a:cs typeface="Consolas"/>
+              </a:rPr>
+              <a:t>a6</a:t>
+            </a:r>
+            <a:endParaRPr lang="en-US" sz="1100" dirty="0"/>
+          </a:p>
+        </p:txBody>
+      </p:sp>
+      <p:sp>
+        <p:nvSpPr>
+          <p:cNvPr id="246" name="Process 245"/>
+          <p:cNvSpPr/>
+          <p:nvPr/>
+        </p:nvSpPr>
+        <p:spPr>
+          <a:xfrm>
+            <a:off x="3668035" y="3759124"/>
+            <a:ext cx="765314" cy="584258"/>
+          </a:xfrm>
+          <a:prstGeom prst="flowChartProcess">
+            <a:avLst/>
+          </a:prstGeom>
+          <a:noFill/>
+        </p:spPr>
+        <p:style>
+          <a:lnRef idx="1">
+            <a:schemeClr val="accent3"/>
+          </a:lnRef>
+          <a:fillRef idx="2">
+            <a:schemeClr val="accent3"/>
+          </a:fillRef>
+          <a:effectRef idx="1">
+            <a:schemeClr val="accent3"/>
+          </a:effectRef>
+          <a:fontRef idx="minor">
+            <a:schemeClr val="dk1"/>
+          </a:fontRef>
+        </p:style>
+        <p:txBody>
+          <a:bodyPr rtlCol="0" anchor="ctr"/>
+          <a:lstStyle/>
+          <a:p>
+            <a:pPr algn="ctr"/>
+            <a:r>
+              <a:rPr lang="en-US" dirty="0" smtClean="0"/>
+              <a:t>Step 6</a:t>
+            </a:r>
+            <a:endParaRPr lang="en-US" dirty="0"/>
+          </a:p>
+        </p:txBody>
+      </p:sp>
+      <p:sp>
+        <p:nvSpPr>
+          <p:cNvPr id="247" name="Process 246"/>
+          <p:cNvSpPr/>
+          <p:nvPr/>
+        </p:nvSpPr>
+        <p:spPr>
+          <a:xfrm>
+            <a:off x="7306587" y="3759124"/>
+            <a:ext cx="765314" cy="584258"/>
+          </a:xfrm>
+          <a:prstGeom prst="flowChartProcess">
+            <a:avLst/>
+          </a:prstGeom>
+          <a:noFill/>
+        </p:spPr>
+        <p:style>
+          <a:lnRef idx="1">
+            <a:schemeClr val="accent3"/>
+          </a:lnRef>
+          <a:fillRef idx="2">
+            <a:schemeClr val="accent3"/>
+          </a:fillRef>
+          <a:effectRef idx="1">
+            <a:schemeClr val="accent3"/>
+          </a:effectRef>
+          <a:fontRef idx="minor">
+            <a:schemeClr val="dk1"/>
+          </a:fontRef>
+        </p:style>
+        <p:txBody>
+          <a:bodyPr rtlCol="0" anchor="ctr"/>
+          <a:lstStyle/>
+          <a:p>
+            <a:pPr algn="ctr"/>
+            <a:r>
+              <a:rPr lang="en-US" dirty="0" smtClean="0"/>
+              <a:t>Step 8</a:t>
+            </a:r>
+            <a:endParaRPr lang="en-US" dirty="0"/>
+          </a:p>
+        </p:txBody>
+      </p:sp>
+      <p:sp>
+        <p:nvSpPr>
+          <p:cNvPr id="248" name="Process 247"/>
+          <p:cNvSpPr/>
+          <p:nvPr/>
+        </p:nvSpPr>
+        <p:spPr>
+          <a:xfrm>
+            <a:off x="5505342" y="3755557"/>
+            <a:ext cx="765314" cy="584258"/>
+          </a:xfrm>
+          <a:prstGeom prst="flowChartProcess">
+            <a:avLst/>
+          </a:prstGeom>
+          <a:noFill/>
+        </p:spPr>
+        <p:style>
+          <a:lnRef idx="1">
+            <a:schemeClr val="accent3"/>
+          </a:lnRef>
+          <a:fillRef idx="2">
+            <a:schemeClr val="accent3"/>
+          </a:fillRef>
+          <a:effectRef idx="1">
+            <a:schemeClr val="accent3"/>
+          </a:effectRef>
+          <a:fontRef idx="minor">
+            <a:schemeClr val="dk1"/>
+          </a:fontRef>
+        </p:style>
+        <p:txBody>
+          <a:bodyPr rtlCol="0" anchor="ctr"/>
+          <a:lstStyle/>
+          <a:p>
+            <a:pPr algn="ctr"/>
+            <a:r>
+              <a:rPr lang="en-US" dirty="0" smtClean="0"/>
+              <a:t>Step 7</a:t>
+            </a:r>
+            <a:endParaRPr lang="en-US" dirty="0"/>
+          </a:p>
+        </p:txBody>
+      </p:sp>
+      <p:cxnSp>
+        <p:nvCxnSpPr>
+          <p:cNvPr id="249" name="Straight Connector 248"/>
+          <p:cNvCxnSpPr>
+            <a:stCxn id="251" idx="3"/>
+            <a:endCxn id="252" idx="1"/>
+          </p:cNvCxnSpPr>
+          <p:nvPr/>
+        </p:nvCxnSpPr>
+        <p:spPr>
+          <a:xfrm flipV="1">
+            <a:off x="6634654" y="4064381"/>
+            <a:ext cx="318906" cy="6268"/>
+          </a:xfrm>
+          <a:prstGeom prst="line">
+            <a:avLst/>
+          </a:prstGeom>
+          <a:ln w="12700" cmpd="sng">
+            <a:tailEnd type="triangle" w="lg"/>
+          </a:ln>
+        </p:spPr>
+        <p:style>
+          <a:lnRef idx="2">
+            <a:schemeClr val="accent3"/>
+          </a:lnRef>
+          <a:fillRef idx="0">
+            <a:schemeClr val="accent3"/>
+          </a:fillRef>
+          <a:effectRef idx="1">
+            <a:schemeClr val="accent3"/>
+          </a:effectRef>
+          <a:fontRef idx="minor">
+            <a:schemeClr val="tx1"/>
+          </a:fontRef>
+        </p:style>
+      </p:cxnSp>
+      <p:cxnSp>
+        <p:nvCxnSpPr>
+          <p:cNvPr id="250" name="Straight Connector 249"/>
+          <p:cNvCxnSpPr>
+            <a:stCxn id="242" idx="3"/>
+            <a:endCxn id="265" idx="1"/>
+          </p:cNvCxnSpPr>
+          <p:nvPr/>
+        </p:nvCxnSpPr>
+        <p:spPr>
+          <a:xfrm flipV="1">
+            <a:off x="2977071" y="4018791"/>
+            <a:ext cx="332468" cy="11174"/>
+          </a:xfrm>
+          <a:prstGeom prst="line">
+            <a:avLst/>
+          </a:prstGeom>
+          <a:ln w="12700" cmpd="sng">
+            <a:tailEnd type="triangle" w="lg"/>
+          </a:ln>
+        </p:spPr>
+        <p:style>
+          <a:lnRef idx="2">
+            <a:schemeClr val="accent3"/>
+          </a:lnRef>
+          <a:fillRef idx="0">
+            <a:schemeClr val="accent3"/>
+          </a:fillRef>
+          <a:effectRef idx="1">
+            <a:schemeClr val="accent3"/>
+          </a:effectRef>
+          <a:fontRef idx="minor">
+            <a:schemeClr val="tx1"/>
+          </a:fontRef>
+        </p:style>
+      </p:cxnSp>
+      <p:sp>
+        <p:nvSpPr>
+          <p:cNvPr id="251" name="Rectangle 250"/>
+          <p:cNvSpPr/>
+          <p:nvPr/>
+        </p:nvSpPr>
+        <p:spPr>
+          <a:xfrm>
+            <a:off x="6294872" y="3939844"/>
+            <a:ext cx="339782" cy="261610"/>
+          </a:xfrm>
+          <a:prstGeom prst="rect">
+            <a:avLst/>
+          </a:prstGeom>
+        </p:spPr>
+        <p:txBody>
+          <a:bodyPr wrap="none">
+            <a:spAutoFit/>
+          </a:bodyPr>
+          <a:lstStyle/>
+          <a:p>
+            <a:r>
+              <a:rPr lang="en-US" sz="1100" dirty="0" smtClean="0">
+                <a:solidFill>
+                  <a:schemeClr val="bg2">
+                    <a:lumMod val="50000"/>
+                  </a:schemeClr>
+                </a:solidFill>
+                <a:latin typeface="Consolas"/>
+                <a:cs typeface="Consolas"/>
+              </a:rPr>
+              <a:t>a7</a:t>
+            </a:r>
+            <a:endParaRPr lang="en-US" sz="1100" dirty="0"/>
+          </a:p>
+        </p:txBody>
+      </p:sp>
+      <p:sp>
+        <p:nvSpPr>
+          <p:cNvPr id="252" name="Rectangle 251"/>
+          <p:cNvSpPr/>
+          <p:nvPr/>
+        </p:nvSpPr>
+        <p:spPr>
+          <a:xfrm>
+            <a:off x="6953560" y="3933576"/>
+            <a:ext cx="339782" cy="261610"/>
+          </a:xfrm>
+          <a:prstGeom prst="rect">
+            <a:avLst/>
+          </a:prstGeom>
+        </p:spPr>
+        <p:txBody>
+          <a:bodyPr wrap="none">
+            <a:spAutoFit/>
+          </a:bodyPr>
+          <a:lstStyle/>
+          <a:p>
+            <a:r>
+              <a:rPr lang="en-US" sz="1100" dirty="0" smtClean="0">
+                <a:solidFill>
+                  <a:schemeClr val="bg2">
+                    <a:lumMod val="50000"/>
+                  </a:schemeClr>
+                </a:solidFill>
+                <a:latin typeface="Consolas"/>
+                <a:cs typeface="Consolas"/>
+              </a:rPr>
+              <a:t>a7</a:t>
+            </a:r>
+            <a:endParaRPr lang="en-US" sz="1100" dirty="0"/>
+          </a:p>
+        </p:txBody>
+      </p:sp>
+      <p:sp>
+        <p:nvSpPr>
+          <p:cNvPr id="260" name="Rectangle 259"/>
+          <p:cNvSpPr/>
+          <p:nvPr/>
+        </p:nvSpPr>
+        <p:spPr>
+          <a:xfrm>
+            <a:off x="4457008" y="3952377"/>
+            <a:ext cx="494897" cy="261610"/>
+          </a:xfrm>
+          <a:prstGeom prst="rect">
+            <a:avLst/>
+          </a:prstGeom>
+        </p:spPr>
+        <p:txBody>
+          <a:bodyPr wrap="none">
+            <a:spAutoFit/>
+          </a:bodyPr>
+          <a:lstStyle/>
+          <a:p>
+            <a:r>
+              <a:rPr lang="en-US" sz="1100" dirty="0" smtClean="0">
+                <a:solidFill>
+                  <a:schemeClr val="bg2">
+                    <a:lumMod val="50000"/>
+                  </a:schemeClr>
+                </a:solidFill>
+                <a:latin typeface="Consolas"/>
+                <a:cs typeface="Consolas"/>
+              </a:rPr>
+              <a:t>None</a:t>
+            </a:r>
+            <a:endParaRPr lang="en-US" sz="1100" dirty="0"/>
+          </a:p>
+        </p:txBody>
+      </p:sp>
+      <p:sp>
+        <p:nvSpPr>
+          <p:cNvPr id="261" name="Rectangle 260"/>
+          <p:cNvSpPr/>
+          <p:nvPr/>
+        </p:nvSpPr>
+        <p:spPr>
+          <a:xfrm>
+            <a:off x="8071901" y="2458289"/>
+            <a:ext cx="339782" cy="261610"/>
+          </a:xfrm>
+          <a:prstGeom prst="rect">
+            <a:avLst/>
+          </a:prstGeom>
+        </p:spPr>
+        <p:txBody>
+          <a:bodyPr wrap="none">
+            <a:spAutoFit/>
+          </a:bodyPr>
+          <a:lstStyle/>
+          <a:p>
+            <a:r>
+              <a:rPr lang="en-US" sz="1100" dirty="0" smtClean="0">
+                <a:solidFill>
+                  <a:schemeClr val="bg2">
+                    <a:lumMod val="50000"/>
+                  </a:schemeClr>
+                </a:solidFill>
+                <a:latin typeface="Consolas"/>
+                <a:cs typeface="Consolas"/>
+              </a:rPr>
+              <a:t>a5</a:t>
+            </a:r>
+            <a:endParaRPr lang="en-US" sz="1100" dirty="0"/>
+          </a:p>
+        </p:txBody>
+      </p:sp>
+      <p:sp>
+        <p:nvSpPr>
+          <p:cNvPr id="265" name="Rectangle 264"/>
+          <p:cNvSpPr/>
+          <p:nvPr/>
+        </p:nvSpPr>
+        <p:spPr>
+          <a:xfrm>
+            <a:off x="3309539" y="3887986"/>
+            <a:ext cx="339782" cy="261610"/>
+          </a:xfrm>
+          <a:prstGeom prst="rect">
+            <a:avLst/>
+          </a:prstGeom>
+        </p:spPr>
+        <p:txBody>
+          <a:bodyPr wrap="none">
+            <a:spAutoFit/>
+          </a:bodyPr>
+          <a:lstStyle/>
+          <a:p>
+            <a:r>
+              <a:rPr lang="en-US" sz="1100" dirty="0" smtClean="0">
+                <a:solidFill>
+                  <a:schemeClr val="bg2">
+                    <a:lumMod val="50000"/>
+                  </a:schemeClr>
+                </a:solidFill>
+                <a:latin typeface="Consolas"/>
+                <a:cs typeface="Consolas"/>
+              </a:rPr>
+              <a:t>a6</a:t>
+            </a:r>
+            <a:endParaRPr lang="en-US" sz="1100" dirty="0"/>
+          </a:p>
+        </p:txBody>
+      </p:sp>
+      <p:cxnSp>
+        <p:nvCxnSpPr>
+          <p:cNvPr id="282" name="Straight Connector 281"/>
+          <p:cNvCxnSpPr/>
+          <p:nvPr/>
+        </p:nvCxnSpPr>
+        <p:spPr>
+          <a:xfrm>
+            <a:off x="4522017" y="2735450"/>
+            <a:ext cx="670959" cy="1121218"/>
+          </a:xfrm>
+          <a:prstGeom prst="line">
+            <a:avLst/>
+          </a:prstGeom>
+          <a:ln w="12700" cmpd="sng">
+            <a:tailEnd type="triangle" w="lg"/>
+          </a:ln>
+        </p:spPr>
+        <p:style>
+          <a:lnRef idx="2">
+            <a:schemeClr val="accent3"/>
+          </a:lnRef>
+          <a:fillRef idx="0">
+            <a:schemeClr val="accent3"/>
+          </a:fillRef>
+          <a:effectRef idx="1">
+            <a:schemeClr val="accent3"/>
+          </a:effectRef>
+          <a:fontRef idx="minor">
+            <a:schemeClr val="tx1"/>
+          </a:fontRef>
+        </p:style>
+      </p:cxnSp>
+      <p:cxnSp>
+        <p:nvCxnSpPr>
+          <p:cNvPr id="305" name="Curved Connector 304"/>
+          <p:cNvCxnSpPr>
+            <a:stCxn id="265" idx="2"/>
+            <a:endCxn id="244" idx="2"/>
+          </p:cNvCxnSpPr>
+          <p:nvPr/>
+        </p:nvCxnSpPr>
+        <p:spPr>
+          <a:xfrm rot="16200000" flipH="1">
+            <a:off x="4334503" y="3294523"/>
+            <a:ext cx="95812" cy="1805958"/>
+          </a:xfrm>
+          <a:prstGeom prst="curvedConnector3">
+            <a:avLst>
+              <a:gd name="adj1" fmla="val 485875"/>
+            </a:avLst>
+          </a:prstGeom>
+          <a:ln w="12700" cmpd="sng">
+            <a:tailEnd type="triangle"/>
+          </a:ln>
+        </p:spPr>
+        <p:style>
+          <a:lnRef idx="2">
+            <a:schemeClr val="accent3"/>
+          </a:lnRef>
+          <a:fillRef idx="0">
+            <a:schemeClr val="accent3"/>
+          </a:fillRef>
+          <a:effectRef idx="1">
+            <a:schemeClr val="accent3"/>
+          </a:effectRef>
+          <a:fontRef idx="minor">
+            <a:schemeClr val="tx1"/>
+          </a:fontRef>
+        </p:style>
+      </p:cxnSp>
+      <p:sp>
+        <p:nvSpPr>
+          <p:cNvPr id="316" name="Rectangle 315"/>
+          <p:cNvSpPr/>
+          <p:nvPr/>
+        </p:nvSpPr>
+        <p:spPr>
+          <a:xfrm>
+            <a:off x="8071901" y="3952377"/>
+            <a:ext cx="339782" cy="261610"/>
+          </a:xfrm>
+          <a:prstGeom prst="rect">
+            <a:avLst/>
+          </a:prstGeom>
+        </p:spPr>
+        <p:txBody>
+          <a:bodyPr wrap="none">
+            <a:spAutoFit/>
+          </a:bodyPr>
+          <a:lstStyle/>
+          <a:p>
+            <a:r>
+              <a:rPr lang="en-US" sz="1100" dirty="0" smtClean="0">
+                <a:solidFill>
+                  <a:schemeClr val="bg2">
+                    <a:lumMod val="50000"/>
+                  </a:schemeClr>
+                </a:solidFill>
+                <a:latin typeface="Consolas"/>
+                <a:cs typeface="Consolas"/>
+              </a:rPr>
+              <a:t>a8</a:t>
+            </a:r>
+            <a:endParaRPr lang="en-US" sz="1100" dirty="0"/>
+          </a:p>
+        </p:txBody>
+      </p:sp>
+      <p:cxnSp>
+        <p:nvCxnSpPr>
+          <p:cNvPr id="317" name="Straight Connector 316"/>
+          <p:cNvCxnSpPr/>
+          <p:nvPr/>
+        </p:nvCxnSpPr>
+        <p:spPr>
+          <a:xfrm>
+            <a:off x="1760090" y="5273858"/>
+            <a:ext cx="835273" cy="0"/>
+          </a:xfrm>
+          <a:prstGeom prst="line">
+            <a:avLst/>
+          </a:prstGeom>
+          <a:ln w="12700" cmpd="sng">
+            <a:tailEnd type="triangle" w="lg"/>
+          </a:ln>
+        </p:spPr>
+        <p:style>
+          <a:lnRef idx="2">
+            <a:schemeClr val="accent3"/>
+          </a:lnRef>
+          <a:fillRef idx="0">
+            <a:schemeClr val="accent3"/>
+          </a:fillRef>
+          <a:effectRef idx="1">
+            <a:schemeClr val="accent3"/>
+          </a:effectRef>
+          <a:fontRef idx="minor">
+            <a:schemeClr val="tx1"/>
+          </a:fontRef>
+        </p:style>
+      </p:cxnSp>
+      <p:sp>
+        <p:nvSpPr>
+          <p:cNvPr id="321" name="Rectangle 320"/>
+          <p:cNvSpPr/>
+          <p:nvPr/>
+        </p:nvSpPr>
+        <p:spPr>
+          <a:xfrm>
+            <a:off x="2614078" y="5143053"/>
+            <a:ext cx="339782" cy="261610"/>
+          </a:xfrm>
+          <a:prstGeom prst="rect">
+            <a:avLst/>
+          </a:prstGeom>
+        </p:spPr>
+        <p:txBody>
+          <a:bodyPr wrap="none">
+            <a:spAutoFit/>
+          </a:bodyPr>
+          <a:lstStyle/>
+          <a:p>
+            <a:r>
+              <a:rPr lang="en-US" sz="1100" dirty="0" smtClean="0">
+                <a:solidFill>
+                  <a:schemeClr val="bg2">
+                    <a:lumMod val="50000"/>
+                  </a:schemeClr>
+                </a:solidFill>
+                <a:latin typeface="Consolas"/>
+                <a:cs typeface="Consolas"/>
+              </a:rPr>
+              <a:t>a1</a:t>
+            </a:r>
+            <a:endParaRPr lang="en-US" sz="1100" dirty="0"/>
+          </a:p>
+        </p:txBody>
+      </p:sp>
+      <p:cxnSp>
+        <p:nvCxnSpPr>
+          <p:cNvPr id="322" name="Straight Connector 321"/>
+          <p:cNvCxnSpPr/>
+          <p:nvPr/>
+        </p:nvCxnSpPr>
+        <p:spPr>
+          <a:xfrm flipV="1">
+            <a:off x="2979216" y="5000864"/>
+            <a:ext cx="835273" cy="292322"/>
+          </a:xfrm>
+          <a:prstGeom prst="line">
+            <a:avLst/>
+          </a:prstGeom>
+          <a:ln w="12700" cmpd="sng">
+            <a:tailEnd type="triangle" w="lg"/>
+          </a:ln>
+        </p:spPr>
+        <p:style>
+          <a:lnRef idx="2">
+            <a:schemeClr val="accent3"/>
+          </a:lnRef>
+          <a:fillRef idx="0">
+            <a:schemeClr val="accent3"/>
+          </a:fillRef>
+          <a:effectRef idx="1">
+            <a:schemeClr val="accent3"/>
+          </a:effectRef>
+          <a:fontRef idx="minor">
+            <a:schemeClr val="tx1"/>
+          </a:fontRef>
+        </p:style>
+      </p:cxnSp>
+      <p:cxnSp>
+        <p:nvCxnSpPr>
+          <p:cNvPr id="323" name="Straight Connector 322"/>
+          <p:cNvCxnSpPr>
+            <a:endCxn id="344" idx="1"/>
+          </p:cNvCxnSpPr>
+          <p:nvPr/>
+        </p:nvCxnSpPr>
+        <p:spPr>
+          <a:xfrm flipV="1">
+            <a:off x="1873227" y="6388818"/>
+            <a:ext cx="1988355" cy="14853"/>
+          </a:xfrm>
+          <a:prstGeom prst="line">
+            <a:avLst/>
+          </a:prstGeom>
+          <a:ln w="12700" cmpd="sng">
+            <a:tailEnd type="triangle" w="lg"/>
+          </a:ln>
+        </p:spPr>
+        <p:style>
+          <a:lnRef idx="2">
+            <a:schemeClr val="accent3"/>
+          </a:lnRef>
+          <a:fillRef idx="0">
+            <a:schemeClr val="accent3"/>
+          </a:fillRef>
+          <a:effectRef idx="1">
+            <a:schemeClr val="accent3"/>
+          </a:effectRef>
+          <a:fontRef idx="minor">
+            <a:schemeClr val="tx1"/>
+          </a:fontRef>
+        </p:style>
+      </p:cxnSp>
+      <p:sp>
+        <p:nvSpPr>
+          <p:cNvPr id="324" name="Rectangle 323"/>
+          <p:cNvSpPr/>
+          <p:nvPr/>
+        </p:nvSpPr>
+        <p:spPr>
+          <a:xfrm>
+            <a:off x="1872346" y="5000864"/>
+            <a:ext cx="650013" cy="261610"/>
+          </a:xfrm>
+          <a:prstGeom prst="rect">
+            <a:avLst/>
+          </a:prstGeom>
+        </p:spPr>
+        <p:txBody>
+          <a:bodyPr wrap="none">
+            <a:spAutoFit/>
+          </a:bodyPr>
+          <a:lstStyle/>
+          <a:p>
+            <a:r>
+              <a:rPr lang="en-US" sz="1100" dirty="0" smtClean="0">
+                <a:solidFill>
+                  <a:schemeClr val="bg2">
+                    <a:lumMod val="50000"/>
+                  </a:schemeClr>
+                </a:solidFill>
+                <a:latin typeface="Consolas"/>
+                <a:cs typeface="Consolas"/>
+              </a:rPr>
+              <a:t>Step 1</a:t>
+            </a:r>
+            <a:endParaRPr lang="en-US" sz="1100" dirty="0"/>
+          </a:p>
+        </p:txBody>
+      </p:sp>
+      <p:sp>
+        <p:nvSpPr>
+          <p:cNvPr id="325" name="Rectangle 324"/>
+          <p:cNvSpPr/>
+          <p:nvPr/>
+        </p:nvSpPr>
+        <p:spPr>
+          <a:xfrm>
+            <a:off x="1873227" y="6130504"/>
+            <a:ext cx="650013" cy="261610"/>
+          </a:xfrm>
+          <a:prstGeom prst="rect">
+            <a:avLst/>
+          </a:prstGeom>
+        </p:spPr>
+        <p:txBody>
+          <a:bodyPr wrap="none">
+            <a:spAutoFit/>
+          </a:bodyPr>
+          <a:lstStyle/>
+          <a:p>
+            <a:r>
+              <a:rPr lang="en-US" sz="1100" dirty="0" smtClean="0">
+                <a:solidFill>
+                  <a:schemeClr val="bg2">
+                    <a:lumMod val="50000"/>
+                  </a:schemeClr>
+                </a:solidFill>
+                <a:latin typeface="Consolas"/>
+                <a:cs typeface="Consolas"/>
+              </a:rPr>
+              <a:t>Step 5</a:t>
+            </a:r>
+            <a:endParaRPr lang="en-US" sz="1100" dirty="0"/>
+          </a:p>
+        </p:txBody>
+      </p:sp>
+      <p:sp>
+        <p:nvSpPr>
+          <p:cNvPr id="326" name="Rectangle 325"/>
+          <p:cNvSpPr/>
+          <p:nvPr/>
+        </p:nvSpPr>
+        <p:spPr>
+          <a:xfrm rot="20257769">
+            <a:off x="2953895" y="4870058"/>
+            <a:ext cx="650013" cy="261610"/>
+          </a:xfrm>
+          <a:prstGeom prst="rect">
+            <a:avLst/>
+          </a:prstGeom>
+        </p:spPr>
+        <p:txBody>
+          <a:bodyPr wrap="none">
+            <a:spAutoFit/>
+          </a:bodyPr>
+          <a:lstStyle/>
+          <a:p>
+            <a:r>
+              <a:rPr lang="en-US" sz="1100" dirty="0" smtClean="0">
+                <a:solidFill>
+                  <a:schemeClr val="bg2">
+                    <a:lumMod val="50000"/>
+                  </a:schemeClr>
+                </a:solidFill>
+                <a:latin typeface="Consolas"/>
+                <a:cs typeface="Consolas"/>
+              </a:rPr>
+              <a:t>Step 3</a:t>
+            </a:r>
+            <a:endParaRPr lang="en-US" sz="1100" dirty="0"/>
+          </a:p>
+        </p:txBody>
+      </p:sp>
+      <p:cxnSp>
+        <p:nvCxnSpPr>
+          <p:cNvPr id="327" name="Straight Connector 326"/>
+          <p:cNvCxnSpPr/>
+          <p:nvPr/>
+        </p:nvCxnSpPr>
+        <p:spPr>
+          <a:xfrm>
+            <a:off x="3038582" y="5421038"/>
+            <a:ext cx="800294" cy="253268"/>
+          </a:xfrm>
+          <a:prstGeom prst="line">
+            <a:avLst/>
+          </a:prstGeom>
+          <a:ln w="12700" cmpd="sng">
+            <a:tailEnd type="triangle" w="lg"/>
+          </a:ln>
+        </p:spPr>
+        <p:style>
+          <a:lnRef idx="2">
+            <a:schemeClr val="accent3"/>
+          </a:lnRef>
+          <a:fillRef idx="0">
+            <a:schemeClr val="accent3"/>
+          </a:fillRef>
+          <a:effectRef idx="1">
+            <a:schemeClr val="accent3"/>
+          </a:effectRef>
+          <a:fontRef idx="minor">
+            <a:schemeClr val="tx1"/>
+          </a:fontRef>
+        </p:style>
+      </p:cxnSp>
+      <p:sp>
+        <p:nvSpPr>
+          <p:cNvPr id="330" name="Rectangle 329"/>
+          <p:cNvSpPr/>
+          <p:nvPr/>
+        </p:nvSpPr>
+        <p:spPr>
+          <a:xfrm rot="1031145">
+            <a:off x="3140575" y="5288741"/>
+            <a:ext cx="650013" cy="261610"/>
+          </a:xfrm>
+          <a:prstGeom prst="rect">
+            <a:avLst/>
+          </a:prstGeom>
+        </p:spPr>
+        <p:txBody>
+          <a:bodyPr wrap="none">
+            <a:spAutoFit/>
+          </a:bodyPr>
+          <a:lstStyle/>
+          <a:p>
+            <a:r>
+              <a:rPr lang="en-US" sz="1100" dirty="0" smtClean="0">
+                <a:solidFill>
+                  <a:schemeClr val="bg2">
+                    <a:lumMod val="50000"/>
+                  </a:schemeClr>
+                </a:solidFill>
+                <a:latin typeface="Consolas"/>
+                <a:cs typeface="Consolas"/>
+              </a:rPr>
+              <a:t>Step 2</a:t>
+            </a:r>
+            <a:endParaRPr lang="en-US" sz="1100" dirty="0"/>
+          </a:p>
+        </p:txBody>
+      </p:sp>
+      <p:sp>
+        <p:nvSpPr>
+          <p:cNvPr id="331" name="Rectangle 330"/>
+          <p:cNvSpPr/>
+          <p:nvPr/>
+        </p:nvSpPr>
+        <p:spPr>
+          <a:xfrm>
+            <a:off x="3806258" y="4842406"/>
+            <a:ext cx="339782" cy="261610"/>
+          </a:xfrm>
+          <a:prstGeom prst="rect">
+            <a:avLst/>
+          </a:prstGeom>
+        </p:spPr>
+        <p:txBody>
+          <a:bodyPr wrap="none">
+            <a:spAutoFit/>
+          </a:bodyPr>
+          <a:lstStyle/>
+          <a:p>
+            <a:r>
+              <a:rPr lang="en-US" sz="1100" dirty="0" smtClean="0">
+                <a:solidFill>
+                  <a:schemeClr val="bg2">
+                    <a:lumMod val="50000"/>
+                  </a:schemeClr>
+                </a:solidFill>
+                <a:latin typeface="Consolas"/>
+                <a:cs typeface="Consolas"/>
+              </a:rPr>
+              <a:t>a3</a:t>
+            </a:r>
+            <a:endParaRPr lang="en-US" sz="1100" dirty="0"/>
+          </a:p>
+        </p:txBody>
+      </p:sp>
+      <p:sp>
+        <p:nvSpPr>
+          <p:cNvPr id="332" name="Rectangle 331"/>
+          <p:cNvSpPr/>
+          <p:nvPr/>
+        </p:nvSpPr>
+        <p:spPr>
+          <a:xfrm>
+            <a:off x="3861582" y="5543501"/>
+            <a:ext cx="339782" cy="261610"/>
+          </a:xfrm>
+          <a:prstGeom prst="rect">
+            <a:avLst/>
+          </a:prstGeom>
+        </p:spPr>
+        <p:txBody>
+          <a:bodyPr wrap="none">
+            <a:spAutoFit/>
+          </a:bodyPr>
+          <a:lstStyle/>
+          <a:p>
+            <a:r>
+              <a:rPr lang="en-US" sz="1100" dirty="0" smtClean="0">
+                <a:solidFill>
+                  <a:schemeClr val="bg2">
+                    <a:lumMod val="50000"/>
+                  </a:schemeClr>
+                </a:solidFill>
+                <a:latin typeface="Consolas"/>
+                <a:cs typeface="Consolas"/>
+              </a:rPr>
+              <a:t>a2</a:t>
+            </a:r>
+            <a:endParaRPr lang="en-US" sz="1100" dirty="0"/>
+          </a:p>
+        </p:txBody>
+      </p:sp>
+      <p:cxnSp>
+        <p:nvCxnSpPr>
+          <p:cNvPr id="333" name="Straight Connector 332"/>
+          <p:cNvCxnSpPr/>
+          <p:nvPr/>
+        </p:nvCxnSpPr>
+        <p:spPr>
+          <a:xfrm>
+            <a:off x="4501949" y="5293186"/>
+            <a:ext cx="905858" cy="0"/>
+          </a:xfrm>
+          <a:prstGeom prst="line">
+            <a:avLst/>
+          </a:prstGeom>
+          <a:ln w="12700" cmpd="sng">
+            <a:tailEnd type="triangle" w="lg"/>
+          </a:ln>
+        </p:spPr>
+        <p:style>
+          <a:lnRef idx="2">
+            <a:schemeClr val="accent3"/>
+          </a:lnRef>
+          <a:fillRef idx="0">
+            <a:schemeClr val="accent3"/>
+          </a:fillRef>
+          <a:effectRef idx="1">
+            <a:schemeClr val="accent3"/>
+          </a:effectRef>
+          <a:fontRef idx="minor">
+            <a:schemeClr val="tx1"/>
+          </a:fontRef>
+        </p:style>
+      </p:cxnSp>
+      <p:cxnSp>
+        <p:nvCxnSpPr>
+          <p:cNvPr id="338" name="Straight Connector 337"/>
+          <p:cNvCxnSpPr>
+            <a:stCxn id="331" idx="3"/>
+          </p:cNvCxnSpPr>
+          <p:nvPr/>
+        </p:nvCxnSpPr>
+        <p:spPr>
+          <a:xfrm>
+            <a:off x="4146040" y="4973211"/>
+            <a:ext cx="355909" cy="319975"/>
+          </a:xfrm>
+          <a:prstGeom prst="line">
+            <a:avLst/>
+          </a:prstGeom>
+          <a:ln/>
+        </p:spPr>
+        <p:style>
+          <a:lnRef idx="2">
+            <a:schemeClr val="accent3"/>
+          </a:lnRef>
+          <a:fillRef idx="0">
+            <a:schemeClr val="accent3"/>
+          </a:fillRef>
+          <a:effectRef idx="1">
+            <a:schemeClr val="accent3"/>
+          </a:effectRef>
+          <a:fontRef idx="minor">
+            <a:schemeClr val="tx1"/>
+          </a:fontRef>
+        </p:style>
+      </p:cxnSp>
+      <p:cxnSp>
+        <p:nvCxnSpPr>
+          <p:cNvPr id="339" name="Straight Connector 338"/>
+          <p:cNvCxnSpPr>
+            <a:stCxn id="332" idx="3"/>
+          </p:cNvCxnSpPr>
+          <p:nvPr/>
+        </p:nvCxnSpPr>
+        <p:spPr>
+          <a:xfrm flipV="1">
+            <a:off x="4201364" y="5293186"/>
+            <a:ext cx="263844" cy="381120"/>
+          </a:xfrm>
+          <a:prstGeom prst="line">
+            <a:avLst/>
+          </a:prstGeom>
+          <a:ln/>
+        </p:spPr>
+        <p:style>
+          <a:lnRef idx="2">
+            <a:schemeClr val="accent3"/>
+          </a:lnRef>
+          <a:fillRef idx="0">
+            <a:schemeClr val="accent3"/>
+          </a:fillRef>
+          <a:effectRef idx="1">
+            <a:schemeClr val="accent3"/>
+          </a:effectRef>
+          <a:fontRef idx="minor">
+            <a:schemeClr val="tx1"/>
+          </a:fontRef>
+        </p:style>
+      </p:cxnSp>
+      <p:sp>
+        <p:nvSpPr>
+          <p:cNvPr id="342" name="Rectangle 341"/>
+          <p:cNvSpPr/>
+          <p:nvPr/>
+        </p:nvSpPr>
+        <p:spPr>
+          <a:xfrm>
+            <a:off x="5469596" y="5166855"/>
+            <a:ext cx="339782" cy="261610"/>
+          </a:xfrm>
+          <a:prstGeom prst="rect">
+            <a:avLst/>
+          </a:prstGeom>
+        </p:spPr>
+        <p:txBody>
+          <a:bodyPr wrap="none">
+            <a:spAutoFit/>
+          </a:bodyPr>
+          <a:lstStyle/>
+          <a:p>
+            <a:r>
+              <a:rPr lang="en-US" sz="1100" dirty="0" smtClean="0">
+                <a:solidFill>
+                  <a:schemeClr val="bg2">
+                    <a:lumMod val="50000"/>
+                  </a:schemeClr>
+                </a:solidFill>
+                <a:latin typeface="Consolas"/>
+                <a:cs typeface="Consolas"/>
+              </a:rPr>
+              <a:t>a5</a:t>
+            </a:r>
+            <a:endParaRPr lang="en-US" sz="1100" dirty="0"/>
+          </a:p>
+        </p:txBody>
+      </p:sp>
+      <p:sp>
+        <p:nvSpPr>
+          <p:cNvPr id="343" name="Rectangle 342"/>
+          <p:cNvSpPr/>
+          <p:nvPr/>
+        </p:nvSpPr>
+        <p:spPr>
+          <a:xfrm>
+            <a:off x="4575816" y="5036050"/>
+            <a:ext cx="650013" cy="261610"/>
+          </a:xfrm>
+          <a:prstGeom prst="rect">
+            <a:avLst/>
+          </a:prstGeom>
+        </p:spPr>
+        <p:txBody>
+          <a:bodyPr wrap="none">
+            <a:spAutoFit/>
+          </a:bodyPr>
+          <a:lstStyle/>
+          <a:p>
+            <a:r>
+              <a:rPr lang="en-US" sz="1100" dirty="0" smtClean="0">
+                <a:solidFill>
+                  <a:schemeClr val="bg2">
+                    <a:lumMod val="50000"/>
+                  </a:schemeClr>
+                </a:solidFill>
+                <a:latin typeface="Consolas"/>
+                <a:cs typeface="Consolas"/>
+              </a:rPr>
+              <a:t>Step 5</a:t>
+            </a:r>
+            <a:endParaRPr lang="en-US" sz="1100" dirty="0"/>
+          </a:p>
+        </p:txBody>
+      </p:sp>
+      <p:sp>
+        <p:nvSpPr>
+          <p:cNvPr id="344" name="Rectangle 343"/>
+          <p:cNvSpPr/>
+          <p:nvPr/>
+        </p:nvSpPr>
+        <p:spPr>
+          <a:xfrm>
+            <a:off x="3861582" y="6258013"/>
+            <a:ext cx="339782" cy="261610"/>
+          </a:xfrm>
+          <a:prstGeom prst="rect">
+            <a:avLst/>
+          </a:prstGeom>
+        </p:spPr>
+        <p:txBody>
+          <a:bodyPr wrap="none">
+            <a:spAutoFit/>
+          </a:bodyPr>
+          <a:lstStyle/>
+          <a:p>
+            <a:r>
+              <a:rPr lang="en-US" sz="1100" dirty="0" smtClean="0">
+                <a:solidFill>
+                  <a:schemeClr val="bg2">
+                    <a:lumMod val="50000"/>
+                  </a:schemeClr>
+                </a:solidFill>
+                <a:latin typeface="Consolas"/>
+                <a:cs typeface="Consolas"/>
+              </a:rPr>
+              <a:t>a6</a:t>
+            </a:r>
+            <a:endParaRPr lang="en-US" sz="1100" dirty="0"/>
+          </a:p>
+        </p:txBody>
+      </p:sp>
+      <p:cxnSp>
+        <p:nvCxnSpPr>
+          <p:cNvPr id="345" name="Straight Connector 344"/>
+          <p:cNvCxnSpPr/>
+          <p:nvPr/>
+        </p:nvCxnSpPr>
+        <p:spPr>
+          <a:xfrm>
+            <a:off x="4344168" y="6392114"/>
+            <a:ext cx="578227" cy="233023"/>
+          </a:xfrm>
+          <a:prstGeom prst="line">
+            <a:avLst/>
+          </a:prstGeom>
+          <a:ln w="12700" cmpd="sng">
+            <a:tailEnd type="triangle" w="lg"/>
+          </a:ln>
+        </p:spPr>
+        <p:style>
+          <a:lnRef idx="2">
+            <a:schemeClr val="accent3"/>
+          </a:lnRef>
+          <a:fillRef idx="0">
+            <a:schemeClr val="accent3"/>
+          </a:fillRef>
+          <a:effectRef idx="1">
+            <a:schemeClr val="accent3"/>
+          </a:effectRef>
+          <a:fontRef idx="minor">
+            <a:schemeClr val="tx1"/>
+          </a:fontRef>
+        </p:style>
+      </p:cxnSp>
+      <p:sp>
+        <p:nvSpPr>
+          <p:cNvPr id="346" name="Rectangle 345"/>
+          <p:cNvSpPr/>
+          <p:nvPr/>
+        </p:nvSpPr>
+        <p:spPr>
+          <a:xfrm rot="1496264">
+            <a:off x="4414318" y="6238688"/>
+            <a:ext cx="650013" cy="261610"/>
+          </a:xfrm>
+          <a:prstGeom prst="rect">
+            <a:avLst/>
+          </a:prstGeom>
+        </p:spPr>
+        <p:txBody>
+          <a:bodyPr wrap="none">
+            <a:spAutoFit/>
+          </a:bodyPr>
+          <a:lstStyle/>
+          <a:p>
+            <a:r>
+              <a:rPr lang="en-US" sz="1100" dirty="0" smtClean="0">
+                <a:solidFill>
+                  <a:schemeClr val="bg2">
+                    <a:lumMod val="50000"/>
+                  </a:schemeClr>
+                </a:solidFill>
+                <a:latin typeface="Consolas"/>
+                <a:cs typeface="Consolas"/>
+              </a:rPr>
+              <a:t>Step 6</a:t>
+            </a:r>
+            <a:endParaRPr lang="en-US" sz="1100" dirty="0"/>
+          </a:p>
+        </p:txBody>
+      </p:sp>
+      <p:cxnSp>
+        <p:nvCxnSpPr>
+          <p:cNvPr id="351" name="Straight Connector 350"/>
+          <p:cNvCxnSpPr/>
+          <p:nvPr/>
+        </p:nvCxnSpPr>
+        <p:spPr>
+          <a:xfrm flipV="1">
+            <a:off x="4297574" y="6010994"/>
+            <a:ext cx="263844" cy="381120"/>
+          </a:xfrm>
+          <a:prstGeom prst="line">
+            <a:avLst/>
+          </a:prstGeom>
+          <a:ln/>
+        </p:spPr>
+        <p:style>
+          <a:lnRef idx="2">
+            <a:schemeClr val="accent3"/>
+          </a:lnRef>
+          <a:fillRef idx="0">
+            <a:schemeClr val="accent3"/>
+          </a:fillRef>
+          <a:effectRef idx="1">
+            <a:schemeClr val="accent3"/>
+          </a:effectRef>
+          <a:fontRef idx="minor">
+            <a:schemeClr val="tx1"/>
+          </a:fontRef>
+        </p:style>
+      </p:cxnSp>
+      <p:cxnSp>
+        <p:nvCxnSpPr>
+          <p:cNvPr id="352" name="Straight Connector 351"/>
+          <p:cNvCxnSpPr/>
+          <p:nvPr/>
+        </p:nvCxnSpPr>
+        <p:spPr>
+          <a:xfrm>
+            <a:off x="4240247" y="5676503"/>
+            <a:ext cx="355909" cy="319975"/>
+          </a:xfrm>
+          <a:prstGeom prst="line">
+            <a:avLst/>
+          </a:prstGeom>
+          <a:ln/>
+        </p:spPr>
+        <p:style>
+          <a:lnRef idx="2">
+            <a:schemeClr val="accent3"/>
+          </a:lnRef>
+          <a:fillRef idx="0">
+            <a:schemeClr val="accent3"/>
+          </a:fillRef>
+          <a:effectRef idx="1">
+            <a:schemeClr val="accent3"/>
+          </a:effectRef>
+          <a:fontRef idx="minor">
+            <a:schemeClr val="tx1"/>
+          </a:fontRef>
+        </p:style>
+      </p:cxnSp>
+      <p:cxnSp>
+        <p:nvCxnSpPr>
+          <p:cNvPr id="355" name="Straight Connector 354"/>
+          <p:cNvCxnSpPr/>
+          <p:nvPr/>
+        </p:nvCxnSpPr>
+        <p:spPr>
+          <a:xfrm>
+            <a:off x="4601000" y="5949301"/>
+            <a:ext cx="905858" cy="0"/>
+          </a:xfrm>
+          <a:prstGeom prst="line">
+            <a:avLst/>
+          </a:prstGeom>
+          <a:ln w="12700" cmpd="sng">
+            <a:tailEnd type="triangle" w="lg"/>
+          </a:ln>
+        </p:spPr>
+        <p:style>
+          <a:lnRef idx="2">
+            <a:schemeClr val="accent3"/>
+          </a:lnRef>
+          <a:fillRef idx="0">
+            <a:schemeClr val="accent3"/>
+          </a:fillRef>
+          <a:effectRef idx="1">
+            <a:schemeClr val="accent3"/>
+          </a:effectRef>
+          <a:fontRef idx="minor">
+            <a:schemeClr val="tx1"/>
+          </a:fontRef>
+        </p:style>
+      </p:cxnSp>
+      <p:sp>
+        <p:nvSpPr>
+          <p:cNvPr id="356" name="Rectangle 355"/>
+          <p:cNvSpPr/>
+          <p:nvPr/>
+        </p:nvSpPr>
+        <p:spPr>
+          <a:xfrm>
+            <a:off x="5568647" y="5822970"/>
+            <a:ext cx="339782" cy="261610"/>
+          </a:xfrm>
+          <a:prstGeom prst="rect">
+            <a:avLst/>
+          </a:prstGeom>
+        </p:spPr>
+        <p:txBody>
+          <a:bodyPr wrap="none">
+            <a:spAutoFit/>
+          </a:bodyPr>
+          <a:lstStyle/>
+          <a:p>
+            <a:r>
+              <a:rPr lang="en-US" sz="1100" dirty="0" smtClean="0">
+                <a:solidFill>
+                  <a:schemeClr val="bg2">
+                    <a:lumMod val="50000"/>
+                  </a:schemeClr>
+                </a:solidFill>
+                <a:latin typeface="Consolas"/>
+                <a:cs typeface="Consolas"/>
+              </a:rPr>
+              <a:t>a7</a:t>
+            </a:r>
+            <a:endParaRPr lang="en-US" sz="1100" dirty="0"/>
+          </a:p>
+        </p:txBody>
+      </p:sp>
+      <p:sp>
+        <p:nvSpPr>
+          <p:cNvPr id="357" name="Rectangle 356"/>
+          <p:cNvSpPr/>
+          <p:nvPr/>
+        </p:nvSpPr>
+        <p:spPr>
+          <a:xfrm>
+            <a:off x="4674867" y="5692165"/>
+            <a:ext cx="650013" cy="261610"/>
+          </a:xfrm>
+          <a:prstGeom prst="rect">
+            <a:avLst/>
+          </a:prstGeom>
+        </p:spPr>
+        <p:txBody>
+          <a:bodyPr wrap="none">
+            <a:spAutoFit/>
+          </a:bodyPr>
+          <a:lstStyle/>
+          <a:p>
+            <a:r>
+              <a:rPr lang="en-US" sz="1100" dirty="0" smtClean="0">
+                <a:solidFill>
+                  <a:schemeClr val="bg2">
+                    <a:lumMod val="50000"/>
+                  </a:schemeClr>
+                </a:solidFill>
+                <a:latin typeface="Consolas"/>
+                <a:cs typeface="Consolas"/>
+              </a:rPr>
+              <a:t>Step 7</a:t>
+            </a:r>
+            <a:endParaRPr lang="en-US" sz="1100" dirty="0"/>
+          </a:p>
+        </p:txBody>
+      </p:sp>
+      <p:sp>
+        <p:nvSpPr>
+          <p:cNvPr id="358" name="Rectangle 357"/>
+          <p:cNvSpPr/>
+          <p:nvPr/>
+        </p:nvSpPr>
+        <p:spPr>
+          <a:xfrm>
+            <a:off x="6946502" y="5819403"/>
+            <a:ext cx="339782" cy="261610"/>
+          </a:xfrm>
+          <a:prstGeom prst="rect">
+            <a:avLst/>
+          </a:prstGeom>
+        </p:spPr>
+        <p:txBody>
+          <a:bodyPr wrap="none">
+            <a:spAutoFit/>
+          </a:bodyPr>
+          <a:lstStyle/>
+          <a:p>
+            <a:r>
+              <a:rPr lang="en-US" sz="1100" dirty="0" smtClean="0">
+                <a:solidFill>
+                  <a:schemeClr val="bg2">
+                    <a:lumMod val="50000"/>
+                  </a:schemeClr>
+                </a:solidFill>
+                <a:latin typeface="Consolas"/>
+                <a:cs typeface="Consolas"/>
+              </a:rPr>
+              <a:t>a8</a:t>
+            </a:r>
+            <a:endParaRPr lang="en-US" sz="1100" dirty="0"/>
+          </a:p>
+        </p:txBody>
+      </p:sp>
+      <p:sp>
+        <p:nvSpPr>
+          <p:cNvPr id="359" name="Rectangle 358"/>
+          <p:cNvSpPr/>
+          <p:nvPr/>
+        </p:nvSpPr>
+        <p:spPr>
+          <a:xfrm>
+            <a:off x="6052722" y="5688598"/>
+            <a:ext cx="650013" cy="261610"/>
+          </a:xfrm>
+          <a:prstGeom prst="rect">
+            <a:avLst/>
+          </a:prstGeom>
+        </p:spPr>
+        <p:txBody>
+          <a:bodyPr wrap="none">
+            <a:spAutoFit/>
+          </a:bodyPr>
+          <a:lstStyle/>
+          <a:p>
+            <a:r>
+              <a:rPr lang="en-US" sz="1100" dirty="0" smtClean="0">
+                <a:solidFill>
+                  <a:schemeClr val="bg2">
+                    <a:lumMod val="50000"/>
+                  </a:schemeClr>
+                </a:solidFill>
+                <a:latin typeface="Consolas"/>
+                <a:cs typeface="Consolas"/>
+              </a:rPr>
+              <a:t>Step 8</a:t>
+            </a:r>
+            <a:endParaRPr lang="en-US" sz="1100" dirty="0"/>
+          </a:p>
+        </p:txBody>
+      </p:sp>
+      <p:cxnSp>
+        <p:nvCxnSpPr>
+          <p:cNvPr id="360" name="Straight Connector 359"/>
+          <p:cNvCxnSpPr/>
+          <p:nvPr/>
+        </p:nvCxnSpPr>
+        <p:spPr>
+          <a:xfrm>
+            <a:off x="5988623" y="5965253"/>
+            <a:ext cx="905858" cy="0"/>
+          </a:xfrm>
+          <a:prstGeom prst="line">
+            <a:avLst/>
+          </a:prstGeom>
+          <a:ln w="12700" cmpd="sng">
+            <a:tailEnd type="triangle" w="lg"/>
+          </a:ln>
+        </p:spPr>
+        <p:style>
+          <a:lnRef idx="2">
+            <a:schemeClr val="accent3"/>
+          </a:lnRef>
+          <a:fillRef idx="0">
+            <a:schemeClr val="accent3"/>
+          </a:fillRef>
+          <a:effectRef idx="1">
+            <a:schemeClr val="accent3"/>
+          </a:effectRef>
+          <a:fontRef idx="minor">
+            <a:schemeClr val="tx1"/>
+          </a:fontRef>
+        </p:style>
+      </p:cxnSp>
+      <p:sp>
+        <p:nvSpPr>
+          <p:cNvPr id="361" name="Rectangle 360"/>
+          <p:cNvSpPr/>
+          <p:nvPr/>
+        </p:nvSpPr>
+        <p:spPr>
+          <a:xfrm>
+            <a:off x="5014728" y="6494332"/>
+            <a:ext cx="494897" cy="261610"/>
+          </a:xfrm>
+          <a:prstGeom prst="rect">
+            <a:avLst/>
+          </a:prstGeom>
+        </p:spPr>
+        <p:txBody>
+          <a:bodyPr wrap="none">
+            <a:spAutoFit/>
+          </a:bodyPr>
+          <a:lstStyle/>
+          <a:p>
+            <a:r>
+              <a:rPr lang="en-US" sz="1100" dirty="0" smtClean="0">
+                <a:solidFill>
+                  <a:schemeClr val="bg2">
+                    <a:lumMod val="50000"/>
+                  </a:schemeClr>
+                </a:solidFill>
+                <a:latin typeface="Consolas"/>
+                <a:cs typeface="Consolas"/>
+              </a:rPr>
+              <a:t>None</a:t>
+            </a:r>
+            <a:endParaRPr lang="en-US" sz="1100" dirty="0"/>
+          </a:p>
+        </p:txBody>
+      </p:sp>
+      <p:sp>
+        <p:nvSpPr>
+          <p:cNvPr id="362" name="TextBox 361"/>
+          <p:cNvSpPr txBox="1"/>
+          <p:nvPr/>
+        </p:nvSpPr>
+        <p:spPr>
+          <a:xfrm>
+            <a:off x="220153" y="2396733"/>
+            <a:ext cx="662674" cy="646331"/>
+          </a:xfrm>
+          <a:prstGeom prst="rect">
+            <a:avLst/>
+          </a:prstGeom>
+          <a:noFill/>
+        </p:spPr>
+        <p:txBody>
+          <a:bodyPr wrap="none" rtlCol="0">
+            <a:spAutoFit/>
+          </a:bodyPr>
+          <a:lstStyle/>
+          <a:p>
+            <a:r>
+              <a:rPr lang="en-US" dirty="0" smtClean="0"/>
+              <a:t>Logic</a:t>
+            </a:r>
+          </a:p>
+          <a:p>
+            <a:r>
+              <a:rPr lang="en-US" dirty="0" smtClean="0"/>
+              <a:t>View</a:t>
+            </a:r>
+            <a:endParaRPr lang="en-US" dirty="0"/>
+          </a:p>
+        </p:txBody>
+      </p:sp>
+      <p:sp>
+        <p:nvSpPr>
+          <p:cNvPr id="363" name="TextBox 362"/>
+          <p:cNvSpPr txBox="1"/>
+          <p:nvPr/>
+        </p:nvSpPr>
+        <p:spPr>
+          <a:xfrm>
+            <a:off x="264426" y="5329091"/>
+            <a:ext cx="1182047" cy="646331"/>
+          </a:xfrm>
+          <a:prstGeom prst="rect">
+            <a:avLst/>
+          </a:prstGeom>
+          <a:noFill/>
+        </p:spPr>
+        <p:txBody>
+          <a:bodyPr wrap="none" rtlCol="0">
+            <a:spAutoFit/>
+          </a:bodyPr>
+          <a:lstStyle/>
+          <a:p>
+            <a:r>
+              <a:rPr lang="en-US" dirty="0" smtClean="0"/>
+              <a:t>Processing</a:t>
+            </a:r>
+          </a:p>
+          <a:p>
+            <a:r>
+              <a:rPr lang="en-US" dirty="0" smtClean="0"/>
+              <a:t>View</a:t>
+            </a:r>
+            <a:endParaRPr lang="en-US" dirty="0"/>
+          </a:p>
+        </p:txBody>
+      </p:sp>
+    </p:spTree>
+    <p:extLst>
+      <p:ext uri="{BB962C8B-B14F-4D97-AF65-F5344CB8AC3E}">
+        <p14:creationId xmlns:p14="http://schemas.microsoft.com/office/powerpoint/2010/main" val="2277091706"/>
       </p:ext>
     </p:extLst>
   </p:cSld>

</xml_diff>